<commit_message>
Clases actualizadas y links de videos de la ayudantía y clase agregados
</commit_message>
<xml_diff>
--- a/Clases/04. Estadísticas de orden & Quicksort.pptx
+++ b/Clases/04. Estadísticas de orden & Quicksort.pptx
@@ -5,7 +5,7 @@
     <p:sldMasterId id="2147484134" r:id="rId1"/>
   </p:sldMasterIdLst>
   <p:notesMasterIdLst>
-    <p:notesMasterId r:id="rId26"/>
+    <p:notesMasterId r:id="rId27"/>
   </p:notesMasterIdLst>
   <p:sldIdLst>
     <p:sldId id="289" r:id="rId2"/>
@@ -32,6 +32,7 @@
     <p:sldId id="297" r:id="rId23"/>
     <p:sldId id="272" r:id="rId24"/>
     <p:sldId id="273" r:id="rId25"/>
+    <p:sldId id="301" r:id="rId26"/>
   </p:sldIdLst>
   <p:sldSz cx="9144000" cy="6858000" type="screen4x3"/>
   <p:notesSz cx="6858000" cy="9144000"/>
@@ -231,7 +232,7 @@
           <a:p>
             <a:fld id="{50A3EF94-9CC9-4FEF-9842-2354CA15831D}" type="datetimeFigureOut">
               <a:rPr lang="es-CL" smtClean="0"/>
-              <a:t>19-08-2019</a:t>
+              <a:t>30-03-2020</a:t>
             </a:fld>
             <a:endParaRPr lang="es-CL"/>
           </a:p>
@@ -10219,6 +10220,2482 @@
     <p:extLst>
       <p:ext uri="{BB962C8B-B14F-4D97-AF65-F5344CB8AC3E}">
         <p14:creationId xmlns:p14="http://schemas.microsoft.com/office/powerpoint/2010/main" val="1690177687"/>
+      </p:ext>
+    </p:extLst>
+  </p:cSld>
+  <p:clrMapOvr>
+    <a:masterClrMapping/>
+  </p:clrMapOvr>
+</p:sld>
+</file>
+
+<file path=ppt/slides/slide25.xml><?xml version="1.0" encoding="utf-8"?>
+<p:sld xmlns:a="http://schemas.openxmlformats.org/drawingml/2006/main" xmlns:r="http://schemas.openxmlformats.org/officeDocument/2006/relationships" xmlns:p="http://schemas.openxmlformats.org/presentationml/2006/main">
+  <p:cSld>
+    <p:spTree>
+      <p:nvGrpSpPr>
+        <p:cNvPr id="1" name=""/>
+        <p:cNvGrpSpPr/>
+        <p:nvPr/>
+      </p:nvGrpSpPr>
+      <p:grpSpPr>
+        <a:xfrm>
+          <a:off x="0" y="0"/>
+          <a:ext cx="0" cy="0"/>
+          <a:chOff x="0" y="0"/>
+          <a:chExt cx="0" cy="0"/>
+        </a:xfrm>
+      </p:grpSpPr>
+      <p:sp>
+        <p:nvSpPr>
+          <p:cNvPr id="2" name="Título 1">
+            <a:extLst>
+              <a:ext uri="{FF2B5EF4-FFF2-40B4-BE49-F238E27FC236}">
+                <a16:creationId xmlns:a16="http://schemas.microsoft.com/office/drawing/2014/main" id="{340C6575-CEE5-431D-A370-BF0454751346}"/>
+              </a:ext>
+            </a:extLst>
+          </p:cNvPr>
+          <p:cNvSpPr>
+            <a:spLocks noGrp="1"/>
+          </p:cNvSpPr>
+          <p:nvPr>
+            <p:ph type="title"/>
+          </p:nvPr>
+        </p:nvSpPr>
+        <p:spPr/>
+        <p:txBody>
+          <a:bodyPr>
+            <a:normAutofit fontScale="90000"/>
+          </a:bodyPr>
+          <a:lstStyle/>
+          <a:p>
+            <a:r>
+              <a:rPr lang="es-CL" dirty="0"/>
+              <a:t>Resumen de algoritmos de ordenación</a:t>
+            </a:r>
+          </a:p>
+        </p:txBody>
+      </p:sp>
+      <mc:AlternateContent xmlns:mc="http://schemas.openxmlformats.org/markup-compatibility/2006">
+        <mc:Choice xmlns:a14="http://schemas.microsoft.com/office/drawing/2010/main" Requires="a14">
+          <p:graphicFrame>
+            <p:nvGraphicFramePr>
+              <p:cNvPr id="4" name="Marcador de contenido 3">
+                <a:extLst>
+                  <a:ext uri="{FF2B5EF4-FFF2-40B4-BE49-F238E27FC236}">
+                    <a16:creationId xmlns:a16="http://schemas.microsoft.com/office/drawing/2014/main" id="{4A68CF4A-9AC6-4DAE-B1A5-C23B6573AD8C}"/>
+                  </a:ext>
+                </a:extLst>
+              </p:cNvPr>
+              <p:cNvGraphicFramePr>
+                <a:graphicFrameLocks noGrp="1"/>
+              </p:cNvGraphicFramePr>
+              <p:nvPr>
+                <p:ph idx="1"/>
+                <p:extLst>
+                  <p:ext uri="{D42A27DB-BD31-4B8C-83A1-F6EECF244321}">
+                    <p14:modId xmlns:p14="http://schemas.microsoft.com/office/powerpoint/2010/main" val="2443921693"/>
+                  </p:ext>
+                </p:extLst>
+              </p:nvPr>
+            </p:nvGraphicFramePr>
+            <p:xfrm>
+              <a:off x="250825" y="1287463"/>
+              <a:ext cx="8642350" cy="2682240"/>
+            </p:xfrm>
+            <a:graphic>
+              <a:graphicData uri="http://schemas.openxmlformats.org/drawingml/2006/table">
+                <a:tbl>
+                  <a:tblPr firstRow="1" bandRow="1">
+                    <a:tableStyleId>{BC89EF96-8CEA-46FF-86C4-4CE0E7609802}</a:tableStyleId>
+                  </a:tblPr>
+                  <a:tblGrid>
+                    <a:gridCol w="1728470">
+                      <a:extLst>
+                        <a:ext uri="{9D8B030D-6E8A-4147-A177-3AD203B41FA5}">
+                          <a16:colId xmlns:a16="http://schemas.microsoft.com/office/drawing/2014/main" val="913066021"/>
+                        </a:ext>
+                      </a:extLst>
+                    </a:gridCol>
+                    <a:gridCol w="1728470">
+                      <a:extLst>
+                        <a:ext uri="{9D8B030D-6E8A-4147-A177-3AD203B41FA5}">
+                          <a16:colId xmlns:a16="http://schemas.microsoft.com/office/drawing/2014/main" val="3692818971"/>
+                        </a:ext>
+                      </a:extLst>
+                    </a:gridCol>
+                    <a:gridCol w="1728470">
+                      <a:extLst>
+                        <a:ext uri="{9D8B030D-6E8A-4147-A177-3AD203B41FA5}">
+                          <a16:colId xmlns:a16="http://schemas.microsoft.com/office/drawing/2014/main" val="585403358"/>
+                        </a:ext>
+                      </a:extLst>
+                    </a:gridCol>
+                    <a:gridCol w="1728470">
+                      <a:extLst>
+                        <a:ext uri="{9D8B030D-6E8A-4147-A177-3AD203B41FA5}">
+                          <a16:colId xmlns:a16="http://schemas.microsoft.com/office/drawing/2014/main" val="1311638582"/>
+                        </a:ext>
+                      </a:extLst>
+                    </a:gridCol>
+                    <a:gridCol w="1728470">
+                      <a:extLst>
+                        <a:ext uri="{9D8B030D-6E8A-4147-A177-3AD203B41FA5}">
+                          <a16:colId xmlns:a16="http://schemas.microsoft.com/office/drawing/2014/main" val="952865867"/>
+                        </a:ext>
+                      </a:extLst>
+                    </a:gridCol>
+                  </a:tblGrid>
+                  <a:tr h="370840">
+                    <a:tc>
+                      <a:txBody>
+                        <a:bodyPr/>
+                        <a:lstStyle/>
+                        <a:p>
+                          <a:pPr algn="ctr"/>
+                          <a:r>
+                            <a:rPr lang="es-CL" sz="2000" dirty="0"/>
+                            <a:t>Algoritmo</a:t>
+                          </a:r>
+                        </a:p>
+                      </a:txBody>
+                      <a:tcPr anchor="ctr">
+                        <a:noFill/>
+                      </a:tcPr>
+                    </a:tc>
+                    <a:tc>
+                      <a:txBody>
+                        <a:bodyPr/>
+                        <a:lstStyle/>
+                        <a:p>
+                          <a:pPr algn="ctr"/>
+                          <a:r>
+                            <a:rPr lang="es-CL" sz="2000" dirty="0"/>
+                            <a:t>Mejor caso</a:t>
+                          </a:r>
+                        </a:p>
+                      </a:txBody>
+                      <a:tcPr anchor="ctr"/>
+                    </a:tc>
+                    <a:tc>
+                      <a:txBody>
+                        <a:bodyPr/>
+                        <a:lstStyle/>
+                        <a:p>
+                          <a:pPr algn="ctr"/>
+                          <a:r>
+                            <a:rPr lang="es-CL" sz="2000" dirty="0"/>
+                            <a:t>Caso promedio</a:t>
+                          </a:r>
+                        </a:p>
+                      </a:txBody>
+                      <a:tcPr anchor="ctr"/>
+                    </a:tc>
+                    <a:tc>
+                      <a:txBody>
+                        <a:bodyPr/>
+                        <a:lstStyle/>
+                        <a:p>
+                          <a:pPr algn="ctr"/>
+                          <a:r>
+                            <a:rPr lang="es-CL" sz="2000" dirty="0"/>
+                            <a:t>Peor caso</a:t>
+                          </a:r>
+                        </a:p>
+                      </a:txBody>
+                      <a:tcPr anchor="ctr"/>
+                    </a:tc>
+                    <a:tc>
+                      <a:txBody>
+                        <a:bodyPr/>
+                        <a:lstStyle/>
+                        <a:p>
+                          <a:pPr algn="ctr"/>
+                          <a:r>
+                            <a:rPr lang="es-CL" sz="2000" dirty="0"/>
+                            <a:t>Memoria adicional</a:t>
+                          </a:r>
+                        </a:p>
+                      </a:txBody>
+                      <a:tcPr anchor="ctr"/>
+                    </a:tc>
+                    <a:extLst>
+                      <a:ext uri="{0D108BD9-81ED-4DB2-BD59-A6C34878D82A}">
+                        <a16:rowId xmlns:a16="http://schemas.microsoft.com/office/drawing/2014/main" val="1454344222"/>
+                      </a:ext>
+                    </a:extLst>
+                  </a:tr>
+                  <a:tr h="370840">
+                    <a:tc>
+                      <a:txBody>
+                        <a:bodyPr/>
+                        <a:lstStyle/>
+                        <a:p>
+                          <a:pPr algn="ctr"/>
+                          <a:r>
+                            <a:rPr lang="es-CL" sz="2000" dirty="0" err="1"/>
+                            <a:t>SelectionSort</a:t>
+                          </a:r>
+                          <a:endParaRPr lang="es-CL" sz="2000" dirty="0"/>
+                        </a:p>
+                      </a:txBody>
+                      <a:tcPr/>
+                    </a:tc>
+                    <a:tc>
+                      <a:txBody>
+                        <a:bodyPr/>
+                        <a:lstStyle/>
+                        <a:p>
+                          <a:pPr/>
+                          <a14:m>
+                            <m:oMathPara xmlns:m="http://schemas.openxmlformats.org/officeDocument/2006/math">
+                              <m:oMathParaPr>
+                                <m:jc m:val="centerGroup"/>
+                              </m:oMathParaPr>
+                              <m:oMath xmlns:m="http://schemas.openxmlformats.org/officeDocument/2006/math">
+                                <m:r>
+                                  <a:rPr lang="es-CL" sz="2000" b="0" i="1" smtClean="0">
+                                    <a:latin typeface="Cambria Math" panose="02040503050406030204" pitchFamily="18" charset="0"/>
+                                  </a:rPr>
+                                  <m:t>𝑂</m:t>
+                                </m:r>
+                                <m:d>
+                                  <m:dPr>
+                                    <m:ctrlPr>
+                                      <a:rPr lang="es-CL" sz="2000" b="0" i="1" smtClean="0">
+                                        <a:latin typeface="Cambria Math" panose="02040503050406030204" pitchFamily="18" charset="0"/>
+                                      </a:rPr>
+                                    </m:ctrlPr>
+                                  </m:dPr>
+                                  <m:e>
+                                    <m:sSup>
+                                      <m:sSupPr>
+                                        <m:ctrlPr>
+                                          <a:rPr lang="es-CL" sz="2000" b="0" i="1" smtClean="0">
+                                            <a:latin typeface="Cambria Math" panose="02040503050406030204" pitchFamily="18" charset="0"/>
+                                          </a:rPr>
+                                        </m:ctrlPr>
+                                      </m:sSupPr>
+                                      <m:e>
+                                        <m:r>
+                                          <a:rPr lang="es-CL" sz="2000" b="0" i="1" smtClean="0">
+                                            <a:latin typeface="Cambria Math" panose="02040503050406030204" pitchFamily="18" charset="0"/>
+                                          </a:rPr>
+                                          <m:t>𝑛</m:t>
+                                        </m:r>
+                                      </m:e>
+                                      <m:sup>
+                                        <m:r>
+                                          <a:rPr lang="es-CL" sz="2000" b="0" i="1" smtClean="0">
+                                            <a:latin typeface="Cambria Math" panose="02040503050406030204" pitchFamily="18" charset="0"/>
+                                          </a:rPr>
+                                          <m:t>2</m:t>
+                                        </m:r>
+                                      </m:sup>
+                                    </m:sSup>
+                                  </m:e>
+                                </m:d>
+                              </m:oMath>
+                            </m:oMathPara>
+                          </a14:m>
+                          <a:endParaRPr lang="es-CL" sz="2000" b="0" dirty="0"/>
+                        </a:p>
+                      </a:txBody>
+                      <a:tcPr/>
+                    </a:tc>
+                    <a:tc>
+                      <a:txBody>
+                        <a:bodyPr/>
+                        <a:lstStyle/>
+                        <a:p>
+                          <a:pPr marL="0" marR="0" lvl="0" indent="0" algn="l" defTabSz="914400" rtl="0" eaLnBrk="1" fontAlgn="auto" latinLnBrk="0" hangingPunct="1">
+                            <a:lnSpc>
+                              <a:spcPct val="100000"/>
+                            </a:lnSpc>
+                            <a:spcBef>
+                              <a:spcPts val="0"/>
+                            </a:spcBef>
+                            <a:spcAft>
+                              <a:spcPts val="0"/>
+                            </a:spcAft>
+                            <a:buClrTx/>
+                            <a:buSzTx/>
+                            <a:buFontTx/>
+                            <a:buNone/>
+                            <a:tabLst/>
+                            <a:defRPr/>
+                          </a:pPr>
+                          <a14:m>
+                            <m:oMathPara xmlns:m="http://schemas.openxmlformats.org/officeDocument/2006/math">
+                              <m:oMathParaPr>
+                                <m:jc m:val="centerGroup"/>
+                              </m:oMathParaPr>
+                              <m:oMath xmlns:m="http://schemas.openxmlformats.org/officeDocument/2006/math">
+                                <m:r>
+                                  <a:rPr lang="es-CL" sz="2000" b="0" i="1" smtClean="0">
+                                    <a:latin typeface="Cambria Math" panose="02040503050406030204" pitchFamily="18" charset="0"/>
+                                  </a:rPr>
+                                  <m:t>𝑂</m:t>
+                                </m:r>
+                                <m:d>
+                                  <m:dPr>
+                                    <m:ctrlPr>
+                                      <a:rPr lang="es-CL" sz="2000" b="0" i="1" smtClean="0">
+                                        <a:latin typeface="Cambria Math" panose="02040503050406030204" pitchFamily="18" charset="0"/>
+                                      </a:rPr>
+                                    </m:ctrlPr>
+                                  </m:dPr>
+                                  <m:e>
+                                    <m:sSup>
+                                      <m:sSupPr>
+                                        <m:ctrlPr>
+                                          <a:rPr lang="es-CL" sz="2000" b="0" i="1" smtClean="0">
+                                            <a:latin typeface="Cambria Math" panose="02040503050406030204" pitchFamily="18" charset="0"/>
+                                          </a:rPr>
+                                        </m:ctrlPr>
+                                      </m:sSupPr>
+                                      <m:e>
+                                        <m:r>
+                                          <a:rPr lang="es-CL" sz="2000" b="0" i="1" smtClean="0">
+                                            <a:latin typeface="Cambria Math" panose="02040503050406030204" pitchFamily="18" charset="0"/>
+                                          </a:rPr>
+                                          <m:t>𝑛</m:t>
+                                        </m:r>
+                                      </m:e>
+                                      <m:sup>
+                                        <m:r>
+                                          <a:rPr lang="es-CL" sz="2000" b="0" i="1" smtClean="0">
+                                            <a:latin typeface="Cambria Math" panose="02040503050406030204" pitchFamily="18" charset="0"/>
+                                          </a:rPr>
+                                          <m:t>2</m:t>
+                                        </m:r>
+                                      </m:sup>
+                                    </m:sSup>
+                                  </m:e>
+                                </m:d>
+                              </m:oMath>
+                            </m:oMathPara>
+                          </a14:m>
+                          <a:endParaRPr lang="es-CL" sz="2000" b="0" dirty="0"/>
+                        </a:p>
+                      </a:txBody>
+                      <a:tcPr/>
+                    </a:tc>
+                    <a:tc>
+                      <a:txBody>
+                        <a:bodyPr/>
+                        <a:lstStyle/>
+                        <a:p>
+                          <a:pPr marL="0" marR="0" lvl="0" indent="0" algn="l" defTabSz="914400" rtl="0" eaLnBrk="1" fontAlgn="auto" latinLnBrk="0" hangingPunct="1">
+                            <a:lnSpc>
+                              <a:spcPct val="100000"/>
+                            </a:lnSpc>
+                            <a:spcBef>
+                              <a:spcPts val="0"/>
+                            </a:spcBef>
+                            <a:spcAft>
+                              <a:spcPts val="0"/>
+                            </a:spcAft>
+                            <a:buClrTx/>
+                            <a:buSzTx/>
+                            <a:buFontTx/>
+                            <a:buNone/>
+                            <a:tabLst/>
+                            <a:defRPr/>
+                          </a:pPr>
+                          <a14:m>
+                            <m:oMathPara xmlns:m="http://schemas.openxmlformats.org/officeDocument/2006/math">
+                              <m:oMathParaPr>
+                                <m:jc m:val="centerGroup"/>
+                              </m:oMathParaPr>
+                              <m:oMath xmlns:m="http://schemas.openxmlformats.org/officeDocument/2006/math">
+                                <m:r>
+                                  <a:rPr lang="es-CL" sz="2000" b="0" i="1" smtClean="0">
+                                    <a:latin typeface="Cambria Math" panose="02040503050406030204" pitchFamily="18" charset="0"/>
+                                  </a:rPr>
+                                  <m:t>𝑂</m:t>
+                                </m:r>
+                                <m:d>
+                                  <m:dPr>
+                                    <m:ctrlPr>
+                                      <a:rPr lang="es-CL" sz="2000" b="0" i="1" smtClean="0">
+                                        <a:latin typeface="Cambria Math" panose="02040503050406030204" pitchFamily="18" charset="0"/>
+                                      </a:rPr>
+                                    </m:ctrlPr>
+                                  </m:dPr>
+                                  <m:e>
+                                    <m:sSup>
+                                      <m:sSupPr>
+                                        <m:ctrlPr>
+                                          <a:rPr lang="es-CL" sz="2000" b="0" i="1" smtClean="0">
+                                            <a:latin typeface="Cambria Math" panose="02040503050406030204" pitchFamily="18" charset="0"/>
+                                          </a:rPr>
+                                        </m:ctrlPr>
+                                      </m:sSupPr>
+                                      <m:e>
+                                        <m:r>
+                                          <a:rPr lang="es-CL" sz="2000" b="0" i="1" smtClean="0">
+                                            <a:latin typeface="Cambria Math" panose="02040503050406030204" pitchFamily="18" charset="0"/>
+                                          </a:rPr>
+                                          <m:t>𝑛</m:t>
+                                        </m:r>
+                                      </m:e>
+                                      <m:sup>
+                                        <m:r>
+                                          <a:rPr lang="es-CL" sz="2000" b="0" i="1" smtClean="0">
+                                            <a:latin typeface="Cambria Math" panose="02040503050406030204" pitchFamily="18" charset="0"/>
+                                          </a:rPr>
+                                          <m:t>2</m:t>
+                                        </m:r>
+                                      </m:sup>
+                                    </m:sSup>
+                                  </m:e>
+                                </m:d>
+                              </m:oMath>
+                            </m:oMathPara>
+                          </a14:m>
+                          <a:endParaRPr lang="es-CL" sz="2000" b="0" dirty="0"/>
+                        </a:p>
+                      </a:txBody>
+                      <a:tcPr/>
+                    </a:tc>
+                    <a:tc>
+                      <a:txBody>
+                        <a:bodyPr/>
+                        <a:lstStyle/>
+                        <a:p>
+                          <a:pPr marL="0" marR="0" lvl="0" indent="0" algn="l" defTabSz="914400" rtl="0" eaLnBrk="1" fontAlgn="auto" latinLnBrk="0" hangingPunct="1">
+                            <a:lnSpc>
+                              <a:spcPct val="100000"/>
+                            </a:lnSpc>
+                            <a:spcBef>
+                              <a:spcPts val="0"/>
+                            </a:spcBef>
+                            <a:spcAft>
+                              <a:spcPts val="0"/>
+                            </a:spcAft>
+                            <a:buClrTx/>
+                            <a:buSzTx/>
+                            <a:buFontTx/>
+                            <a:buNone/>
+                            <a:tabLst/>
+                            <a:defRPr/>
+                          </a:pPr>
+                          <a14:m>
+                            <m:oMathPara xmlns:m="http://schemas.openxmlformats.org/officeDocument/2006/math">
+                              <m:oMathParaPr>
+                                <m:jc m:val="centerGroup"/>
+                              </m:oMathParaPr>
+                              <m:oMath xmlns:m="http://schemas.openxmlformats.org/officeDocument/2006/math">
+                                <m:r>
+                                  <a:rPr lang="es-CL" sz="2000" b="0" i="1" smtClean="0">
+                                    <a:latin typeface="Cambria Math" panose="02040503050406030204" pitchFamily="18" charset="0"/>
+                                  </a:rPr>
+                                  <m:t>𝑂</m:t>
+                                </m:r>
+                                <m:d>
+                                  <m:dPr>
+                                    <m:ctrlPr>
+                                      <a:rPr lang="es-CL" sz="2000" b="0" i="1" smtClean="0">
+                                        <a:latin typeface="Cambria Math" panose="02040503050406030204" pitchFamily="18" charset="0"/>
+                                      </a:rPr>
+                                    </m:ctrlPr>
+                                  </m:dPr>
+                                  <m:e>
+                                    <m:r>
+                                      <a:rPr lang="es-CL" sz="2000" b="0" i="1" smtClean="0">
+                                        <a:latin typeface="Cambria Math" panose="02040503050406030204" pitchFamily="18" charset="0"/>
+                                      </a:rPr>
+                                      <m:t>1</m:t>
+                                    </m:r>
+                                  </m:e>
+                                </m:d>
+                              </m:oMath>
+                            </m:oMathPara>
+                          </a14:m>
+                          <a:endParaRPr lang="es-CL" sz="2000" b="0" dirty="0"/>
+                        </a:p>
+                      </a:txBody>
+                      <a:tcPr/>
+                    </a:tc>
+                    <a:extLst>
+                      <a:ext uri="{0D108BD9-81ED-4DB2-BD59-A6C34878D82A}">
+                        <a16:rowId xmlns:a16="http://schemas.microsoft.com/office/drawing/2014/main" val="1773186148"/>
+                      </a:ext>
+                    </a:extLst>
+                  </a:tr>
+                  <a:tr h="370840">
+                    <a:tc>
+                      <a:txBody>
+                        <a:bodyPr/>
+                        <a:lstStyle/>
+                        <a:p>
+                          <a:pPr algn="ctr"/>
+                          <a:r>
+                            <a:rPr lang="es-CL" sz="2000" dirty="0" err="1"/>
+                            <a:t>InsertionSort</a:t>
+                          </a:r>
+                          <a:endParaRPr lang="es-CL" sz="2000" dirty="0"/>
+                        </a:p>
+                      </a:txBody>
+                      <a:tcPr/>
+                    </a:tc>
+                    <a:tc>
+                      <a:txBody>
+                        <a:bodyPr/>
+                        <a:lstStyle/>
+                        <a:p>
+                          <a:pPr/>
+                          <a14:m>
+                            <m:oMathPara xmlns:m="http://schemas.openxmlformats.org/officeDocument/2006/math">
+                              <m:oMathParaPr>
+                                <m:jc m:val="centerGroup"/>
+                              </m:oMathParaPr>
+                              <m:oMath xmlns:m="http://schemas.openxmlformats.org/officeDocument/2006/math">
+                                <m:r>
+                                  <a:rPr lang="es-CL" sz="2000" b="0" i="1" smtClean="0">
+                                    <a:latin typeface="Cambria Math" panose="02040503050406030204" pitchFamily="18" charset="0"/>
+                                  </a:rPr>
+                                  <m:t>𝑂</m:t>
+                                </m:r>
+                                <m:r>
+                                  <a:rPr lang="es-CL" sz="2000" b="0" i="1" smtClean="0">
+                                    <a:latin typeface="Cambria Math" panose="02040503050406030204" pitchFamily="18" charset="0"/>
+                                  </a:rPr>
+                                  <m:t>(</m:t>
+                                </m:r>
+                                <m:r>
+                                  <a:rPr lang="es-CL" sz="2000" b="0" i="1" smtClean="0">
+                                    <a:latin typeface="Cambria Math" panose="02040503050406030204" pitchFamily="18" charset="0"/>
+                                  </a:rPr>
+                                  <m:t>𝑛</m:t>
+                                </m:r>
+                                <m:r>
+                                  <a:rPr lang="es-CL" sz="2000" b="0" i="1" smtClean="0">
+                                    <a:latin typeface="Cambria Math" panose="02040503050406030204" pitchFamily="18" charset="0"/>
+                                  </a:rPr>
+                                  <m:t>)</m:t>
+                                </m:r>
+                              </m:oMath>
+                            </m:oMathPara>
+                          </a14:m>
+                          <a:endParaRPr lang="es-CL" sz="2000" b="0" dirty="0"/>
+                        </a:p>
+                      </a:txBody>
+                      <a:tcPr/>
+                    </a:tc>
+                    <a:tc>
+                      <a:txBody>
+                        <a:bodyPr/>
+                        <a:lstStyle/>
+                        <a:p>
+                          <a:pPr/>
+                          <a14:m>
+                            <m:oMathPara xmlns:m="http://schemas.openxmlformats.org/officeDocument/2006/math">
+                              <m:oMathParaPr>
+                                <m:jc m:val="centerGroup"/>
+                              </m:oMathParaPr>
+                              <m:oMath xmlns:m="http://schemas.openxmlformats.org/officeDocument/2006/math">
+                                <m:r>
+                                  <a:rPr lang="es-CL" sz="2000" b="0" i="1" smtClean="0">
+                                    <a:latin typeface="Cambria Math" panose="02040503050406030204" pitchFamily="18" charset="0"/>
+                                  </a:rPr>
+                                  <m:t>𝑂</m:t>
+                                </m:r>
+                                <m:d>
+                                  <m:dPr>
+                                    <m:ctrlPr>
+                                      <a:rPr lang="es-CL" sz="2000" b="0" i="1" smtClean="0">
+                                        <a:latin typeface="Cambria Math" panose="02040503050406030204" pitchFamily="18" charset="0"/>
+                                      </a:rPr>
+                                    </m:ctrlPr>
+                                  </m:dPr>
+                                  <m:e>
+                                    <m:sSup>
+                                      <m:sSupPr>
+                                        <m:ctrlPr>
+                                          <a:rPr lang="es-CL" sz="2000" b="0" i="1" smtClean="0">
+                                            <a:latin typeface="Cambria Math" panose="02040503050406030204" pitchFamily="18" charset="0"/>
+                                          </a:rPr>
+                                        </m:ctrlPr>
+                                      </m:sSupPr>
+                                      <m:e>
+                                        <m:r>
+                                          <a:rPr lang="es-CL" sz="2000" b="0" i="1" smtClean="0">
+                                            <a:latin typeface="Cambria Math" panose="02040503050406030204" pitchFamily="18" charset="0"/>
+                                          </a:rPr>
+                                          <m:t>𝑛</m:t>
+                                        </m:r>
+                                      </m:e>
+                                      <m:sup>
+                                        <m:r>
+                                          <a:rPr lang="es-CL" sz="2000" b="0" i="1" smtClean="0">
+                                            <a:latin typeface="Cambria Math" panose="02040503050406030204" pitchFamily="18" charset="0"/>
+                                          </a:rPr>
+                                          <m:t>2</m:t>
+                                        </m:r>
+                                      </m:sup>
+                                    </m:sSup>
+                                  </m:e>
+                                </m:d>
+                              </m:oMath>
+                            </m:oMathPara>
+                          </a14:m>
+                          <a:endParaRPr lang="es-CL" sz="2000" b="0" dirty="0"/>
+                        </a:p>
+                      </a:txBody>
+                      <a:tcPr/>
+                    </a:tc>
+                    <a:tc>
+                      <a:txBody>
+                        <a:bodyPr/>
+                        <a:lstStyle/>
+                        <a:p>
+                          <a:pPr/>
+                          <a14:m>
+                            <m:oMathPara xmlns:m="http://schemas.openxmlformats.org/officeDocument/2006/math">
+                              <m:oMathParaPr>
+                                <m:jc m:val="centerGroup"/>
+                              </m:oMathParaPr>
+                              <m:oMath xmlns:m="http://schemas.openxmlformats.org/officeDocument/2006/math">
+                                <m:r>
+                                  <a:rPr lang="es-CL" sz="2000" b="0" i="1" smtClean="0">
+                                    <a:latin typeface="Cambria Math" panose="02040503050406030204" pitchFamily="18" charset="0"/>
+                                  </a:rPr>
+                                  <m:t>𝑂</m:t>
+                                </m:r>
+                                <m:d>
+                                  <m:dPr>
+                                    <m:ctrlPr>
+                                      <a:rPr lang="es-CL" sz="2000" b="0" i="1" smtClean="0">
+                                        <a:latin typeface="Cambria Math" panose="02040503050406030204" pitchFamily="18" charset="0"/>
+                                      </a:rPr>
+                                    </m:ctrlPr>
+                                  </m:dPr>
+                                  <m:e>
+                                    <m:sSup>
+                                      <m:sSupPr>
+                                        <m:ctrlPr>
+                                          <a:rPr lang="es-CL" sz="2000" b="0" i="1" smtClean="0">
+                                            <a:latin typeface="Cambria Math" panose="02040503050406030204" pitchFamily="18" charset="0"/>
+                                          </a:rPr>
+                                        </m:ctrlPr>
+                                      </m:sSupPr>
+                                      <m:e>
+                                        <m:r>
+                                          <a:rPr lang="es-CL" sz="2000" b="0" i="1" smtClean="0">
+                                            <a:latin typeface="Cambria Math" panose="02040503050406030204" pitchFamily="18" charset="0"/>
+                                          </a:rPr>
+                                          <m:t>𝑛</m:t>
+                                        </m:r>
+                                      </m:e>
+                                      <m:sup>
+                                        <m:r>
+                                          <a:rPr lang="es-CL" sz="2000" b="0" i="1" smtClean="0">
+                                            <a:latin typeface="Cambria Math" panose="02040503050406030204" pitchFamily="18" charset="0"/>
+                                          </a:rPr>
+                                          <m:t>2</m:t>
+                                        </m:r>
+                                      </m:sup>
+                                    </m:sSup>
+                                  </m:e>
+                                </m:d>
+                              </m:oMath>
+                            </m:oMathPara>
+                          </a14:m>
+                          <a:endParaRPr lang="es-CL" sz="2000" b="0" dirty="0"/>
+                        </a:p>
+                      </a:txBody>
+                      <a:tcPr/>
+                    </a:tc>
+                    <a:tc>
+                      <a:txBody>
+                        <a:bodyPr/>
+                        <a:lstStyle/>
+                        <a:p>
+                          <a:pPr marL="0" marR="0" lvl="0" indent="0" algn="l" defTabSz="914400" rtl="0" eaLnBrk="1" fontAlgn="auto" latinLnBrk="0" hangingPunct="1">
+                            <a:lnSpc>
+                              <a:spcPct val="100000"/>
+                            </a:lnSpc>
+                            <a:spcBef>
+                              <a:spcPts val="0"/>
+                            </a:spcBef>
+                            <a:spcAft>
+                              <a:spcPts val="0"/>
+                            </a:spcAft>
+                            <a:buClrTx/>
+                            <a:buSzTx/>
+                            <a:buFontTx/>
+                            <a:buNone/>
+                            <a:tabLst/>
+                            <a:defRPr/>
+                          </a:pPr>
+                          <a14:m>
+                            <m:oMathPara xmlns:m="http://schemas.openxmlformats.org/officeDocument/2006/math">
+                              <m:oMathParaPr>
+                                <m:jc m:val="centerGroup"/>
+                              </m:oMathParaPr>
+                              <m:oMath xmlns:m="http://schemas.openxmlformats.org/officeDocument/2006/math">
+                                <m:r>
+                                  <a:rPr lang="es-CL" sz="2000" b="0" i="1" smtClean="0">
+                                    <a:latin typeface="Cambria Math" panose="02040503050406030204" pitchFamily="18" charset="0"/>
+                                  </a:rPr>
+                                  <m:t>𝑂</m:t>
+                                </m:r>
+                                <m:d>
+                                  <m:dPr>
+                                    <m:ctrlPr>
+                                      <a:rPr lang="es-CL" sz="2000" b="0" i="1" smtClean="0">
+                                        <a:latin typeface="Cambria Math" panose="02040503050406030204" pitchFamily="18" charset="0"/>
+                                      </a:rPr>
+                                    </m:ctrlPr>
+                                  </m:dPr>
+                                  <m:e>
+                                    <m:r>
+                                      <a:rPr lang="es-CL" sz="2000" b="0" i="1" smtClean="0">
+                                        <a:latin typeface="Cambria Math" panose="02040503050406030204" pitchFamily="18" charset="0"/>
+                                      </a:rPr>
+                                      <m:t>1</m:t>
+                                    </m:r>
+                                  </m:e>
+                                </m:d>
+                              </m:oMath>
+                            </m:oMathPara>
+                          </a14:m>
+                          <a:endParaRPr lang="es-CL" sz="2000" b="0" dirty="0"/>
+                        </a:p>
+                      </a:txBody>
+                      <a:tcPr/>
+                    </a:tc>
+                    <a:extLst>
+                      <a:ext uri="{0D108BD9-81ED-4DB2-BD59-A6C34878D82A}">
+                        <a16:rowId xmlns:a16="http://schemas.microsoft.com/office/drawing/2014/main" val="2097436092"/>
+                      </a:ext>
+                    </a:extLst>
+                  </a:tr>
+                  <a:tr h="370840">
+                    <a:tc>
+                      <a:txBody>
+                        <a:bodyPr/>
+                        <a:lstStyle/>
+                        <a:p>
+                          <a:pPr algn="ctr"/>
+                          <a:r>
+                            <a:rPr lang="es-CL" sz="2000" dirty="0" err="1"/>
+                            <a:t>QuickSort</a:t>
+                          </a:r>
+                          <a:endParaRPr lang="es-CL" sz="2000" dirty="0"/>
+                        </a:p>
+                      </a:txBody>
+                      <a:tcPr/>
+                    </a:tc>
+                    <a:tc>
+                      <a:txBody>
+                        <a:bodyPr/>
+                        <a:lstStyle/>
+                        <a:p>
+                          <a:pPr/>
+                          <a14:m>
+                            <m:oMathPara xmlns:m="http://schemas.openxmlformats.org/officeDocument/2006/math">
+                              <m:oMathParaPr>
+                                <m:jc m:val="centerGroup"/>
+                              </m:oMathParaPr>
+                              <m:oMath xmlns:m="http://schemas.openxmlformats.org/officeDocument/2006/math">
+                                <m:r>
+                                  <a:rPr lang="es-CL" sz="2000" b="0" i="1" smtClean="0">
+                                    <a:latin typeface="Cambria Math" panose="02040503050406030204" pitchFamily="18" charset="0"/>
+                                  </a:rPr>
+                                  <m:t>𝑂</m:t>
+                                </m:r>
+                                <m:r>
+                                  <a:rPr lang="es-CL" sz="2000" b="0" i="1" smtClean="0">
+                                    <a:latin typeface="Cambria Math" panose="02040503050406030204" pitchFamily="18" charset="0"/>
+                                  </a:rPr>
+                                  <m:t>(</m:t>
+                                </m:r>
+                                <m:r>
+                                  <a:rPr lang="es-CL" sz="2000" b="0" i="1" smtClean="0">
+                                    <a:latin typeface="Cambria Math" panose="02040503050406030204" pitchFamily="18" charset="0"/>
+                                  </a:rPr>
+                                  <m:t>𝑛</m:t>
+                                </m:r>
+                                <m:r>
+                                  <a:rPr lang="es-CL" sz="2000" b="0" i="1" smtClean="0">
+                                    <a:latin typeface="Cambria Math" panose="02040503050406030204" pitchFamily="18" charset="0"/>
+                                  </a:rPr>
+                                  <m:t>⋅</m:t>
+                                </m:r>
+                                <m:func>
+                                  <m:funcPr>
+                                    <m:ctrlPr>
+                                      <a:rPr lang="es-CL" sz="2000" b="0" i="1" smtClean="0">
+                                        <a:latin typeface="Cambria Math" panose="02040503050406030204" pitchFamily="18" charset="0"/>
+                                      </a:rPr>
+                                    </m:ctrlPr>
+                                  </m:funcPr>
+                                  <m:fName>
+                                    <m:r>
+                                      <m:rPr>
+                                        <m:sty m:val="p"/>
+                                      </m:rPr>
+                                      <a:rPr lang="es-CL" sz="2000" b="0" i="0" smtClean="0">
+                                        <a:latin typeface="Cambria Math" panose="02040503050406030204" pitchFamily="18" charset="0"/>
+                                      </a:rPr>
+                                      <m:t>log</m:t>
+                                    </m:r>
+                                  </m:fName>
+                                  <m:e>
+                                    <m:r>
+                                      <a:rPr lang="es-CL" sz="2000" b="0" i="1" smtClean="0">
+                                        <a:latin typeface="Cambria Math" panose="02040503050406030204" pitchFamily="18" charset="0"/>
+                                      </a:rPr>
+                                      <m:t>𝑛</m:t>
+                                    </m:r>
+                                    <m:r>
+                                      <a:rPr lang="es-CL" sz="2000" b="0" i="1" smtClean="0">
+                                        <a:latin typeface="Cambria Math" panose="02040503050406030204" pitchFamily="18" charset="0"/>
+                                      </a:rPr>
+                                      <m:t>)</m:t>
+                                    </m:r>
+                                  </m:e>
+                                </m:func>
+                              </m:oMath>
+                            </m:oMathPara>
+                          </a14:m>
+                          <a:endParaRPr lang="es-CL" sz="2000" b="0" dirty="0"/>
+                        </a:p>
+                      </a:txBody>
+                      <a:tcPr/>
+                    </a:tc>
+                    <a:tc>
+                      <a:txBody>
+                        <a:bodyPr/>
+                        <a:lstStyle/>
+                        <a:p>
+                          <a:pPr/>
+                          <a14:m>
+                            <m:oMathPara xmlns:m="http://schemas.openxmlformats.org/officeDocument/2006/math">
+                              <m:oMathParaPr>
+                                <m:jc m:val="centerGroup"/>
+                              </m:oMathParaPr>
+                              <m:oMath xmlns:m="http://schemas.openxmlformats.org/officeDocument/2006/math">
+                                <m:r>
+                                  <a:rPr lang="es-CL" sz="2000" b="0" i="1" smtClean="0">
+                                    <a:latin typeface="Cambria Math" panose="02040503050406030204" pitchFamily="18" charset="0"/>
+                                  </a:rPr>
+                                  <m:t>𝑂</m:t>
+                                </m:r>
+                                <m:r>
+                                  <a:rPr lang="es-CL" sz="2000" b="0" i="1" smtClean="0">
+                                    <a:latin typeface="Cambria Math" panose="02040503050406030204" pitchFamily="18" charset="0"/>
+                                  </a:rPr>
+                                  <m:t>(</m:t>
+                                </m:r>
+                                <m:r>
+                                  <a:rPr lang="es-CL" sz="2000" b="0" i="1" smtClean="0">
+                                    <a:latin typeface="Cambria Math" panose="02040503050406030204" pitchFamily="18" charset="0"/>
+                                  </a:rPr>
+                                  <m:t>𝑛</m:t>
+                                </m:r>
+                                <m:r>
+                                  <a:rPr lang="es-CL" sz="2000" b="0" i="1" smtClean="0">
+                                    <a:latin typeface="Cambria Math" panose="02040503050406030204" pitchFamily="18" charset="0"/>
+                                  </a:rPr>
+                                  <m:t>⋅</m:t>
+                                </m:r>
+                                <m:func>
+                                  <m:funcPr>
+                                    <m:ctrlPr>
+                                      <a:rPr lang="es-CL" sz="2000" b="0" i="1" smtClean="0">
+                                        <a:latin typeface="Cambria Math" panose="02040503050406030204" pitchFamily="18" charset="0"/>
+                                      </a:rPr>
+                                    </m:ctrlPr>
+                                  </m:funcPr>
+                                  <m:fName>
+                                    <m:r>
+                                      <m:rPr>
+                                        <m:sty m:val="p"/>
+                                      </m:rPr>
+                                      <a:rPr lang="es-CL" sz="2000" b="0" i="0" smtClean="0">
+                                        <a:latin typeface="Cambria Math" panose="02040503050406030204" pitchFamily="18" charset="0"/>
+                                      </a:rPr>
+                                      <m:t>log</m:t>
+                                    </m:r>
+                                  </m:fName>
+                                  <m:e>
+                                    <m:r>
+                                      <a:rPr lang="es-CL" sz="2000" b="0" i="1" smtClean="0">
+                                        <a:latin typeface="Cambria Math" panose="02040503050406030204" pitchFamily="18" charset="0"/>
+                                      </a:rPr>
+                                      <m:t>𝑛</m:t>
+                                    </m:r>
+                                    <m:r>
+                                      <a:rPr lang="es-CL" sz="2000" b="0" i="1" smtClean="0">
+                                        <a:latin typeface="Cambria Math" panose="02040503050406030204" pitchFamily="18" charset="0"/>
+                                      </a:rPr>
+                                      <m:t>)</m:t>
+                                    </m:r>
+                                  </m:e>
+                                </m:func>
+                              </m:oMath>
+                            </m:oMathPara>
+                          </a14:m>
+                          <a:endParaRPr lang="es-CL" sz="2000" b="0" dirty="0"/>
+                        </a:p>
+                      </a:txBody>
+                      <a:tcPr/>
+                    </a:tc>
+                    <a:tc>
+                      <a:txBody>
+                        <a:bodyPr/>
+                        <a:lstStyle/>
+                        <a:p>
+                          <a:pPr/>
+                          <a14:m>
+                            <m:oMathPara xmlns:m="http://schemas.openxmlformats.org/officeDocument/2006/math">
+                              <m:oMathParaPr>
+                                <m:jc m:val="centerGroup"/>
+                              </m:oMathParaPr>
+                              <m:oMath xmlns:m="http://schemas.openxmlformats.org/officeDocument/2006/math">
+                                <m:r>
+                                  <a:rPr lang="es-CL" sz="2000" b="0" i="1" smtClean="0">
+                                    <a:latin typeface="Cambria Math" panose="02040503050406030204" pitchFamily="18" charset="0"/>
+                                  </a:rPr>
+                                  <m:t>𝑂</m:t>
+                                </m:r>
+                                <m:d>
+                                  <m:dPr>
+                                    <m:ctrlPr>
+                                      <a:rPr lang="es-CL" sz="2000" b="0" i="1" smtClean="0">
+                                        <a:latin typeface="Cambria Math" panose="02040503050406030204" pitchFamily="18" charset="0"/>
+                                      </a:rPr>
+                                    </m:ctrlPr>
+                                  </m:dPr>
+                                  <m:e>
+                                    <m:sSup>
+                                      <m:sSupPr>
+                                        <m:ctrlPr>
+                                          <a:rPr lang="es-CL" sz="2000" b="0" i="1" smtClean="0">
+                                            <a:latin typeface="Cambria Math" panose="02040503050406030204" pitchFamily="18" charset="0"/>
+                                          </a:rPr>
+                                        </m:ctrlPr>
+                                      </m:sSupPr>
+                                      <m:e>
+                                        <m:r>
+                                          <a:rPr lang="es-CL" sz="2000" b="0" i="1" smtClean="0">
+                                            <a:latin typeface="Cambria Math" panose="02040503050406030204" pitchFamily="18" charset="0"/>
+                                          </a:rPr>
+                                          <m:t>𝑛</m:t>
+                                        </m:r>
+                                      </m:e>
+                                      <m:sup>
+                                        <m:r>
+                                          <a:rPr lang="es-CL" sz="2000" b="0" i="1" smtClean="0">
+                                            <a:latin typeface="Cambria Math" panose="02040503050406030204" pitchFamily="18" charset="0"/>
+                                          </a:rPr>
+                                          <m:t>2</m:t>
+                                        </m:r>
+                                      </m:sup>
+                                    </m:sSup>
+                                  </m:e>
+                                </m:d>
+                              </m:oMath>
+                            </m:oMathPara>
+                          </a14:m>
+                          <a:endParaRPr lang="es-CL" sz="2000" b="0" dirty="0"/>
+                        </a:p>
+                      </a:txBody>
+                      <a:tcPr/>
+                    </a:tc>
+                    <a:tc>
+                      <a:txBody>
+                        <a:bodyPr/>
+                        <a:lstStyle/>
+                        <a:p>
+                          <a:pPr marL="0" marR="0" lvl="0" indent="0" algn="l" defTabSz="914400" rtl="0" eaLnBrk="1" fontAlgn="auto" latinLnBrk="0" hangingPunct="1">
+                            <a:lnSpc>
+                              <a:spcPct val="100000"/>
+                            </a:lnSpc>
+                            <a:spcBef>
+                              <a:spcPts val="0"/>
+                            </a:spcBef>
+                            <a:spcAft>
+                              <a:spcPts val="0"/>
+                            </a:spcAft>
+                            <a:buClrTx/>
+                            <a:buSzTx/>
+                            <a:buFontTx/>
+                            <a:buNone/>
+                            <a:tabLst/>
+                            <a:defRPr/>
+                          </a:pPr>
+                          <a14:m>
+                            <m:oMathPara xmlns:m="http://schemas.openxmlformats.org/officeDocument/2006/math">
+                              <m:oMathParaPr>
+                                <m:jc m:val="centerGroup"/>
+                              </m:oMathParaPr>
+                              <m:oMath xmlns:m="http://schemas.openxmlformats.org/officeDocument/2006/math">
+                                <m:r>
+                                  <a:rPr lang="es-CL" sz="2000" b="0" i="1" smtClean="0">
+                                    <a:latin typeface="Cambria Math" panose="02040503050406030204" pitchFamily="18" charset="0"/>
+                                  </a:rPr>
+                                  <m:t>𝑂</m:t>
+                                </m:r>
+                                <m:d>
+                                  <m:dPr>
+                                    <m:ctrlPr>
+                                      <a:rPr lang="es-CL" sz="2000" b="0" i="1" smtClean="0">
+                                        <a:latin typeface="Cambria Math" panose="02040503050406030204" pitchFamily="18" charset="0"/>
+                                      </a:rPr>
+                                    </m:ctrlPr>
+                                  </m:dPr>
+                                  <m:e>
+                                    <m:r>
+                                      <a:rPr lang="es-CL" sz="2000" b="0" i="1" smtClean="0">
+                                        <a:latin typeface="Cambria Math" panose="02040503050406030204" pitchFamily="18" charset="0"/>
+                                      </a:rPr>
+                                      <m:t>1</m:t>
+                                    </m:r>
+                                  </m:e>
+                                </m:d>
+                              </m:oMath>
+                            </m:oMathPara>
+                          </a14:m>
+                          <a:endParaRPr lang="es-CL" sz="2000" b="0" dirty="0"/>
+                        </a:p>
+                      </a:txBody>
+                      <a:tcPr/>
+                    </a:tc>
+                    <a:extLst>
+                      <a:ext uri="{0D108BD9-81ED-4DB2-BD59-A6C34878D82A}">
+                        <a16:rowId xmlns:a16="http://schemas.microsoft.com/office/drawing/2014/main" val="3390602628"/>
+                      </a:ext>
+                    </a:extLst>
+                  </a:tr>
+                  <a:tr h="370840">
+                    <a:tc>
+                      <a:txBody>
+                        <a:bodyPr/>
+                        <a:lstStyle/>
+                        <a:p>
+                          <a:pPr algn="ctr"/>
+                          <a:r>
+                            <a:rPr lang="es-CL" sz="2000" i="0" dirty="0" err="1"/>
+                            <a:t>MergeSort</a:t>
+                          </a:r>
+                          <a:endParaRPr lang="es-CL" sz="2000" i="0" dirty="0"/>
+                        </a:p>
+                      </a:txBody>
+                      <a:tcPr/>
+                    </a:tc>
+                    <a:tc>
+                      <a:txBody>
+                        <a:bodyPr/>
+                        <a:lstStyle/>
+                        <a:p>
+                          <a:pPr marL="0" marR="0" lvl="0" indent="0" algn="l" defTabSz="914400" rtl="0" eaLnBrk="1" fontAlgn="auto" latinLnBrk="0" hangingPunct="1">
+                            <a:lnSpc>
+                              <a:spcPct val="100000"/>
+                            </a:lnSpc>
+                            <a:spcBef>
+                              <a:spcPts val="0"/>
+                            </a:spcBef>
+                            <a:spcAft>
+                              <a:spcPts val="0"/>
+                            </a:spcAft>
+                            <a:buClrTx/>
+                            <a:buSzTx/>
+                            <a:buFontTx/>
+                            <a:buNone/>
+                            <a:tabLst/>
+                            <a:defRPr/>
+                          </a:pPr>
+                          <a14:m>
+                            <m:oMathPara xmlns:m="http://schemas.openxmlformats.org/officeDocument/2006/math">
+                              <m:oMathParaPr>
+                                <m:jc m:val="centerGroup"/>
+                              </m:oMathParaPr>
+                              <m:oMath xmlns:m="http://schemas.openxmlformats.org/officeDocument/2006/math">
+                                <m:r>
+                                  <a:rPr lang="es-CL" sz="2000" b="0" i="1" smtClean="0">
+                                    <a:latin typeface="Cambria Math" panose="02040503050406030204" pitchFamily="18" charset="0"/>
+                                  </a:rPr>
+                                  <m:t>𝑂</m:t>
+                                </m:r>
+                                <m:r>
+                                  <a:rPr lang="es-CL" sz="2000" b="0" i="1" smtClean="0">
+                                    <a:latin typeface="Cambria Math" panose="02040503050406030204" pitchFamily="18" charset="0"/>
+                                  </a:rPr>
+                                  <m:t>(</m:t>
+                                </m:r>
+                                <m:r>
+                                  <a:rPr lang="es-CL" sz="2000" b="0" i="1" smtClean="0">
+                                    <a:latin typeface="Cambria Math" panose="02040503050406030204" pitchFamily="18" charset="0"/>
+                                  </a:rPr>
+                                  <m:t>𝑛</m:t>
+                                </m:r>
+                                <m:r>
+                                  <a:rPr lang="es-CL" sz="2000" b="0" i="1" smtClean="0">
+                                    <a:latin typeface="Cambria Math" panose="02040503050406030204" pitchFamily="18" charset="0"/>
+                                  </a:rPr>
+                                  <m:t>⋅</m:t>
+                                </m:r>
+                                <m:func>
+                                  <m:funcPr>
+                                    <m:ctrlPr>
+                                      <a:rPr lang="es-CL" sz="2000" b="0" i="1" smtClean="0">
+                                        <a:latin typeface="Cambria Math" panose="02040503050406030204" pitchFamily="18" charset="0"/>
+                                      </a:rPr>
+                                    </m:ctrlPr>
+                                  </m:funcPr>
+                                  <m:fName>
+                                    <m:r>
+                                      <m:rPr>
+                                        <m:sty m:val="p"/>
+                                      </m:rPr>
+                                      <a:rPr lang="es-CL" sz="2000" b="0" i="0" smtClean="0">
+                                        <a:latin typeface="Cambria Math" panose="02040503050406030204" pitchFamily="18" charset="0"/>
+                                      </a:rPr>
+                                      <m:t>log</m:t>
+                                    </m:r>
+                                  </m:fName>
+                                  <m:e>
+                                    <m:r>
+                                      <a:rPr lang="es-CL" sz="2000" b="0" i="1" smtClean="0">
+                                        <a:latin typeface="Cambria Math" panose="02040503050406030204" pitchFamily="18" charset="0"/>
+                                      </a:rPr>
+                                      <m:t>𝑛</m:t>
+                                    </m:r>
+                                    <m:r>
+                                      <a:rPr lang="es-CL" sz="2000" b="0" i="1" smtClean="0">
+                                        <a:latin typeface="Cambria Math" panose="02040503050406030204" pitchFamily="18" charset="0"/>
+                                      </a:rPr>
+                                      <m:t>)</m:t>
+                                    </m:r>
+                                  </m:e>
+                                </m:func>
+                              </m:oMath>
+                            </m:oMathPara>
+                          </a14:m>
+                          <a:endParaRPr lang="es-CL" sz="2000" b="0" dirty="0"/>
+                        </a:p>
+                      </a:txBody>
+                      <a:tcPr/>
+                    </a:tc>
+                    <a:tc>
+                      <a:txBody>
+                        <a:bodyPr/>
+                        <a:lstStyle/>
+                        <a:p>
+                          <a:pPr marL="0" marR="0" lvl="0" indent="0" algn="l" defTabSz="914400" rtl="0" eaLnBrk="1" fontAlgn="auto" latinLnBrk="0" hangingPunct="1">
+                            <a:lnSpc>
+                              <a:spcPct val="100000"/>
+                            </a:lnSpc>
+                            <a:spcBef>
+                              <a:spcPts val="0"/>
+                            </a:spcBef>
+                            <a:spcAft>
+                              <a:spcPts val="0"/>
+                            </a:spcAft>
+                            <a:buClrTx/>
+                            <a:buSzTx/>
+                            <a:buFontTx/>
+                            <a:buNone/>
+                            <a:tabLst/>
+                            <a:defRPr/>
+                          </a:pPr>
+                          <a14:m>
+                            <m:oMathPara xmlns:m="http://schemas.openxmlformats.org/officeDocument/2006/math">
+                              <m:oMathParaPr>
+                                <m:jc m:val="centerGroup"/>
+                              </m:oMathParaPr>
+                              <m:oMath xmlns:m="http://schemas.openxmlformats.org/officeDocument/2006/math">
+                                <m:r>
+                                  <a:rPr lang="es-CL" sz="2000" b="0" i="1" smtClean="0">
+                                    <a:latin typeface="Cambria Math" panose="02040503050406030204" pitchFamily="18" charset="0"/>
+                                  </a:rPr>
+                                  <m:t>𝑂</m:t>
+                                </m:r>
+                                <m:r>
+                                  <a:rPr lang="es-CL" sz="2000" b="0" i="1" smtClean="0">
+                                    <a:latin typeface="Cambria Math" panose="02040503050406030204" pitchFamily="18" charset="0"/>
+                                  </a:rPr>
+                                  <m:t>(</m:t>
+                                </m:r>
+                                <m:r>
+                                  <a:rPr lang="es-CL" sz="2000" b="0" i="1" smtClean="0">
+                                    <a:latin typeface="Cambria Math" panose="02040503050406030204" pitchFamily="18" charset="0"/>
+                                  </a:rPr>
+                                  <m:t>𝑛</m:t>
+                                </m:r>
+                                <m:r>
+                                  <a:rPr lang="es-CL" sz="2000" b="0" i="1" smtClean="0">
+                                    <a:latin typeface="Cambria Math" panose="02040503050406030204" pitchFamily="18" charset="0"/>
+                                  </a:rPr>
+                                  <m:t>⋅</m:t>
+                                </m:r>
+                                <m:func>
+                                  <m:funcPr>
+                                    <m:ctrlPr>
+                                      <a:rPr lang="es-CL" sz="2000" b="0" i="1" smtClean="0">
+                                        <a:latin typeface="Cambria Math" panose="02040503050406030204" pitchFamily="18" charset="0"/>
+                                      </a:rPr>
+                                    </m:ctrlPr>
+                                  </m:funcPr>
+                                  <m:fName>
+                                    <m:r>
+                                      <m:rPr>
+                                        <m:sty m:val="p"/>
+                                      </m:rPr>
+                                      <a:rPr lang="es-CL" sz="2000" b="0" i="0" smtClean="0">
+                                        <a:latin typeface="Cambria Math" panose="02040503050406030204" pitchFamily="18" charset="0"/>
+                                      </a:rPr>
+                                      <m:t>log</m:t>
+                                    </m:r>
+                                  </m:fName>
+                                  <m:e>
+                                    <m:r>
+                                      <a:rPr lang="es-CL" sz="2000" b="0" i="1" smtClean="0">
+                                        <a:latin typeface="Cambria Math" panose="02040503050406030204" pitchFamily="18" charset="0"/>
+                                      </a:rPr>
+                                      <m:t>𝑛</m:t>
+                                    </m:r>
+                                    <m:r>
+                                      <a:rPr lang="es-CL" sz="2000" b="0" i="1" smtClean="0">
+                                        <a:latin typeface="Cambria Math" panose="02040503050406030204" pitchFamily="18" charset="0"/>
+                                      </a:rPr>
+                                      <m:t>)</m:t>
+                                    </m:r>
+                                  </m:e>
+                                </m:func>
+                              </m:oMath>
+                            </m:oMathPara>
+                          </a14:m>
+                          <a:endParaRPr lang="es-CL" sz="2000" b="0" dirty="0"/>
+                        </a:p>
+                      </a:txBody>
+                      <a:tcPr/>
+                    </a:tc>
+                    <a:tc>
+                      <a:txBody>
+                        <a:bodyPr/>
+                        <a:lstStyle/>
+                        <a:p>
+                          <a:pPr marL="0" marR="0" lvl="0" indent="0" algn="l" defTabSz="914400" rtl="0" eaLnBrk="1" fontAlgn="auto" latinLnBrk="0" hangingPunct="1">
+                            <a:lnSpc>
+                              <a:spcPct val="100000"/>
+                            </a:lnSpc>
+                            <a:spcBef>
+                              <a:spcPts val="0"/>
+                            </a:spcBef>
+                            <a:spcAft>
+                              <a:spcPts val="0"/>
+                            </a:spcAft>
+                            <a:buClrTx/>
+                            <a:buSzTx/>
+                            <a:buFontTx/>
+                            <a:buNone/>
+                            <a:tabLst/>
+                            <a:defRPr/>
+                          </a:pPr>
+                          <a14:m>
+                            <m:oMathPara xmlns:m="http://schemas.openxmlformats.org/officeDocument/2006/math">
+                              <m:oMathParaPr>
+                                <m:jc m:val="centerGroup"/>
+                              </m:oMathParaPr>
+                              <m:oMath xmlns:m="http://schemas.openxmlformats.org/officeDocument/2006/math">
+                                <m:r>
+                                  <a:rPr lang="es-CL" sz="2000" b="0" i="1" smtClean="0">
+                                    <a:latin typeface="Cambria Math" panose="02040503050406030204" pitchFamily="18" charset="0"/>
+                                  </a:rPr>
+                                  <m:t>𝑂</m:t>
+                                </m:r>
+                                <m:r>
+                                  <a:rPr lang="es-CL" sz="2000" b="0" i="1" smtClean="0">
+                                    <a:latin typeface="Cambria Math" panose="02040503050406030204" pitchFamily="18" charset="0"/>
+                                  </a:rPr>
+                                  <m:t>(</m:t>
+                                </m:r>
+                                <m:r>
+                                  <a:rPr lang="es-CL" sz="2000" b="0" i="1" smtClean="0">
+                                    <a:latin typeface="Cambria Math" panose="02040503050406030204" pitchFamily="18" charset="0"/>
+                                  </a:rPr>
+                                  <m:t>𝑛</m:t>
+                                </m:r>
+                                <m:r>
+                                  <a:rPr lang="es-CL" sz="2000" b="0" i="1" smtClean="0">
+                                    <a:latin typeface="Cambria Math" panose="02040503050406030204" pitchFamily="18" charset="0"/>
+                                  </a:rPr>
+                                  <m:t>⋅</m:t>
+                                </m:r>
+                                <m:func>
+                                  <m:funcPr>
+                                    <m:ctrlPr>
+                                      <a:rPr lang="es-CL" sz="2000" b="0" i="1" smtClean="0">
+                                        <a:latin typeface="Cambria Math" panose="02040503050406030204" pitchFamily="18" charset="0"/>
+                                      </a:rPr>
+                                    </m:ctrlPr>
+                                  </m:funcPr>
+                                  <m:fName>
+                                    <m:r>
+                                      <m:rPr>
+                                        <m:sty m:val="p"/>
+                                      </m:rPr>
+                                      <a:rPr lang="es-CL" sz="2000" b="0" i="0" smtClean="0">
+                                        <a:latin typeface="Cambria Math" panose="02040503050406030204" pitchFamily="18" charset="0"/>
+                                      </a:rPr>
+                                      <m:t>log</m:t>
+                                    </m:r>
+                                  </m:fName>
+                                  <m:e>
+                                    <m:r>
+                                      <a:rPr lang="es-CL" sz="2000" b="0" i="1" smtClean="0">
+                                        <a:latin typeface="Cambria Math" panose="02040503050406030204" pitchFamily="18" charset="0"/>
+                                      </a:rPr>
+                                      <m:t>𝑛</m:t>
+                                    </m:r>
+                                    <m:r>
+                                      <a:rPr lang="es-CL" sz="2000" b="0" i="1" smtClean="0">
+                                        <a:latin typeface="Cambria Math" panose="02040503050406030204" pitchFamily="18" charset="0"/>
+                                      </a:rPr>
+                                      <m:t>)</m:t>
+                                    </m:r>
+                                  </m:e>
+                                </m:func>
+                              </m:oMath>
+                            </m:oMathPara>
+                          </a14:m>
+                          <a:endParaRPr lang="es-CL" sz="2000" b="0" dirty="0"/>
+                        </a:p>
+                      </a:txBody>
+                      <a:tcPr/>
+                    </a:tc>
+                    <a:tc>
+                      <a:txBody>
+                        <a:bodyPr/>
+                        <a:lstStyle/>
+                        <a:p>
+                          <a:pPr marL="0" marR="0" lvl="0" indent="0" algn="l" defTabSz="914400" rtl="0" eaLnBrk="1" fontAlgn="auto" latinLnBrk="0" hangingPunct="1">
+                            <a:lnSpc>
+                              <a:spcPct val="100000"/>
+                            </a:lnSpc>
+                            <a:spcBef>
+                              <a:spcPts val="0"/>
+                            </a:spcBef>
+                            <a:spcAft>
+                              <a:spcPts val="0"/>
+                            </a:spcAft>
+                            <a:buClrTx/>
+                            <a:buSzTx/>
+                            <a:buFontTx/>
+                            <a:buNone/>
+                            <a:tabLst/>
+                            <a:defRPr/>
+                          </a:pPr>
+                          <a14:m>
+                            <m:oMathPara xmlns:m="http://schemas.openxmlformats.org/officeDocument/2006/math">
+                              <m:oMathParaPr>
+                                <m:jc m:val="centerGroup"/>
+                              </m:oMathParaPr>
+                              <m:oMath xmlns:m="http://schemas.openxmlformats.org/officeDocument/2006/math">
+                                <m:r>
+                                  <a:rPr lang="es-CL" sz="2000" b="0" i="1" smtClean="0">
+                                    <a:latin typeface="Cambria Math" panose="02040503050406030204" pitchFamily="18" charset="0"/>
+                                  </a:rPr>
+                                  <m:t>𝑂</m:t>
+                                </m:r>
+                                <m:d>
+                                  <m:dPr>
+                                    <m:ctrlPr>
+                                      <a:rPr lang="es-CL" sz="2000" b="0" i="1" smtClean="0">
+                                        <a:latin typeface="Cambria Math" panose="02040503050406030204" pitchFamily="18" charset="0"/>
+                                      </a:rPr>
+                                    </m:ctrlPr>
+                                  </m:dPr>
+                                  <m:e>
+                                    <m:r>
+                                      <a:rPr lang="es-CL" sz="2000" b="0" i="1" smtClean="0">
+                                        <a:latin typeface="Cambria Math" panose="02040503050406030204" pitchFamily="18" charset="0"/>
+                                      </a:rPr>
+                                      <m:t>𝑛</m:t>
+                                    </m:r>
+                                  </m:e>
+                                </m:d>
+                              </m:oMath>
+                            </m:oMathPara>
+                          </a14:m>
+                          <a:endParaRPr lang="es-CL" sz="2000" b="0" dirty="0"/>
+                        </a:p>
+                      </a:txBody>
+                      <a:tcPr/>
+                    </a:tc>
+                    <a:extLst>
+                      <a:ext uri="{0D108BD9-81ED-4DB2-BD59-A6C34878D82A}">
+                        <a16:rowId xmlns:a16="http://schemas.microsoft.com/office/drawing/2014/main" val="3721942469"/>
+                      </a:ext>
+                    </a:extLst>
+                  </a:tr>
+                  <a:tr h="370840">
+                    <a:tc>
+                      <a:txBody>
+                        <a:bodyPr/>
+                        <a:lstStyle/>
+                        <a:p>
+                          <a:pPr algn="ctr"/>
+                          <a:r>
+                            <a:rPr lang="es-CL" sz="2000" dirty="0"/>
+                            <a:t>?????</a:t>
+                          </a:r>
+                        </a:p>
+                      </a:txBody>
+                      <a:tcPr/>
+                    </a:tc>
+                    <a:tc>
+                      <a:txBody>
+                        <a:bodyPr/>
+                        <a:lstStyle/>
+                        <a:p>
+                          <a:pPr marL="0" marR="0" lvl="0" indent="0" algn="l" defTabSz="914400" rtl="0" eaLnBrk="1" fontAlgn="auto" latinLnBrk="0" hangingPunct="1">
+                            <a:lnSpc>
+                              <a:spcPct val="100000"/>
+                            </a:lnSpc>
+                            <a:spcBef>
+                              <a:spcPts val="0"/>
+                            </a:spcBef>
+                            <a:spcAft>
+                              <a:spcPts val="0"/>
+                            </a:spcAft>
+                            <a:buClrTx/>
+                            <a:buSzTx/>
+                            <a:buFontTx/>
+                            <a:buNone/>
+                            <a:tabLst/>
+                            <a:defRPr/>
+                          </a:pPr>
+                          <a14:m>
+                            <m:oMathPara xmlns:m="http://schemas.openxmlformats.org/officeDocument/2006/math">
+                              <m:oMathParaPr>
+                                <m:jc m:val="centerGroup"/>
+                              </m:oMathParaPr>
+                              <m:oMath xmlns:m="http://schemas.openxmlformats.org/officeDocument/2006/math">
+                                <m:r>
+                                  <a:rPr lang="es-CL" sz="2000" b="0" i="1" smtClean="0">
+                                    <a:latin typeface="Cambria Math" panose="02040503050406030204" pitchFamily="18" charset="0"/>
+                                  </a:rPr>
+                                  <m:t>𝑂</m:t>
+                                </m:r>
+                                <m:r>
+                                  <a:rPr lang="es-CL" sz="2000" b="0" i="1" smtClean="0">
+                                    <a:latin typeface="Cambria Math" panose="02040503050406030204" pitchFamily="18" charset="0"/>
+                                  </a:rPr>
+                                  <m:t>(</m:t>
+                                </m:r>
+                                <m:r>
+                                  <a:rPr lang="es-CL" sz="2000" b="0" i="1" smtClean="0">
+                                    <a:latin typeface="Cambria Math" panose="02040503050406030204" pitchFamily="18" charset="0"/>
+                                  </a:rPr>
+                                  <m:t>𝑛</m:t>
+                                </m:r>
+                                <m:r>
+                                  <a:rPr lang="es-CL" sz="2000" b="0" i="1" smtClean="0">
+                                    <a:latin typeface="Cambria Math" panose="02040503050406030204" pitchFamily="18" charset="0"/>
+                                  </a:rPr>
+                                  <m:t>⋅</m:t>
+                                </m:r>
+                                <m:func>
+                                  <m:funcPr>
+                                    <m:ctrlPr>
+                                      <a:rPr lang="es-CL" sz="2000" b="0" i="1" smtClean="0">
+                                        <a:latin typeface="Cambria Math" panose="02040503050406030204" pitchFamily="18" charset="0"/>
+                                      </a:rPr>
+                                    </m:ctrlPr>
+                                  </m:funcPr>
+                                  <m:fName>
+                                    <m:r>
+                                      <m:rPr>
+                                        <m:sty m:val="p"/>
+                                      </m:rPr>
+                                      <a:rPr lang="es-CL" sz="2000" b="0" i="0" smtClean="0">
+                                        <a:latin typeface="Cambria Math" panose="02040503050406030204" pitchFamily="18" charset="0"/>
+                                      </a:rPr>
+                                      <m:t>log</m:t>
+                                    </m:r>
+                                  </m:fName>
+                                  <m:e>
+                                    <m:r>
+                                      <a:rPr lang="es-CL" sz="2000" b="0" i="1" smtClean="0">
+                                        <a:latin typeface="Cambria Math" panose="02040503050406030204" pitchFamily="18" charset="0"/>
+                                      </a:rPr>
+                                      <m:t>𝑛</m:t>
+                                    </m:r>
+                                    <m:r>
+                                      <a:rPr lang="es-CL" sz="2000" b="0" i="1" smtClean="0">
+                                        <a:latin typeface="Cambria Math" panose="02040503050406030204" pitchFamily="18" charset="0"/>
+                                      </a:rPr>
+                                      <m:t>)</m:t>
+                                    </m:r>
+                                  </m:e>
+                                </m:func>
+                              </m:oMath>
+                            </m:oMathPara>
+                          </a14:m>
+                          <a:endParaRPr lang="es-CL" sz="2000" b="0" dirty="0"/>
+                        </a:p>
+                      </a:txBody>
+                      <a:tcPr/>
+                    </a:tc>
+                    <a:tc>
+                      <a:txBody>
+                        <a:bodyPr/>
+                        <a:lstStyle/>
+                        <a:p>
+                          <a:pPr marL="0" marR="0" lvl="0" indent="0" algn="l" defTabSz="914400" rtl="0" eaLnBrk="1" fontAlgn="auto" latinLnBrk="0" hangingPunct="1">
+                            <a:lnSpc>
+                              <a:spcPct val="100000"/>
+                            </a:lnSpc>
+                            <a:spcBef>
+                              <a:spcPts val="0"/>
+                            </a:spcBef>
+                            <a:spcAft>
+                              <a:spcPts val="0"/>
+                            </a:spcAft>
+                            <a:buClrTx/>
+                            <a:buSzTx/>
+                            <a:buFontTx/>
+                            <a:buNone/>
+                            <a:tabLst/>
+                            <a:defRPr/>
+                          </a:pPr>
+                          <a14:m>
+                            <m:oMathPara xmlns:m="http://schemas.openxmlformats.org/officeDocument/2006/math">
+                              <m:oMathParaPr>
+                                <m:jc m:val="centerGroup"/>
+                              </m:oMathParaPr>
+                              <m:oMath xmlns:m="http://schemas.openxmlformats.org/officeDocument/2006/math">
+                                <m:r>
+                                  <a:rPr lang="es-CL" sz="2000" b="0" i="1" smtClean="0">
+                                    <a:latin typeface="Cambria Math" panose="02040503050406030204" pitchFamily="18" charset="0"/>
+                                  </a:rPr>
+                                  <m:t>𝑂</m:t>
+                                </m:r>
+                                <m:r>
+                                  <a:rPr lang="es-CL" sz="2000" b="0" i="1" smtClean="0">
+                                    <a:latin typeface="Cambria Math" panose="02040503050406030204" pitchFamily="18" charset="0"/>
+                                  </a:rPr>
+                                  <m:t>(</m:t>
+                                </m:r>
+                                <m:r>
+                                  <a:rPr lang="es-CL" sz="2000" b="0" i="1" smtClean="0">
+                                    <a:latin typeface="Cambria Math" panose="02040503050406030204" pitchFamily="18" charset="0"/>
+                                  </a:rPr>
+                                  <m:t>𝑛</m:t>
+                                </m:r>
+                                <m:r>
+                                  <a:rPr lang="es-CL" sz="2000" b="0" i="1" smtClean="0">
+                                    <a:latin typeface="Cambria Math" panose="02040503050406030204" pitchFamily="18" charset="0"/>
+                                  </a:rPr>
+                                  <m:t>⋅</m:t>
+                                </m:r>
+                                <m:func>
+                                  <m:funcPr>
+                                    <m:ctrlPr>
+                                      <a:rPr lang="es-CL" sz="2000" b="0" i="1" smtClean="0">
+                                        <a:latin typeface="Cambria Math" panose="02040503050406030204" pitchFamily="18" charset="0"/>
+                                      </a:rPr>
+                                    </m:ctrlPr>
+                                  </m:funcPr>
+                                  <m:fName>
+                                    <m:r>
+                                      <m:rPr>
+                                        <m:sty m:val="p"/>
+                                      </m:rPr>
+                                      <a:rPr lang="es-CL" sz="2000" b="0" i="0" smtClean="0">
+                                        <a:latin typeface="Cambria Math" panose="02040503050406030204" pitchFamily="18" charset="0"/>
+                                      </a:rPr>
+                                      <m:t>log</m:t>
+                                    </m:r>
+                                  </m:fName>
+                                  <m:e>
+                                    <m:r>
+                                      <a:rPr lang="es-CL" sz="2000" b="0" i="1" smtClean="0">
+                                        <a:latin typeface="Cambria Math" panose="02040503050406030204" pitchFamily="18" charset="0"/>
+                                      </a:rPr>
+                                      <m:t>𝑛</m:t>
+                                    </m:r>
+                                    <m:r>
+                                      <a:rPr lang="es-CL" sz="2000" b="0" i="1" smtClean="0">
+                                        <a:latin typeface="Cambria Math" panose="02040503050406030204" pitchFamily="18" charset="0"/>
+                                      </a:rPr>
+                                      <m:t>)</m:t>
+                                    </m:r>
+                                  </m:e>
+                                </m:func>
+                              </m:oMath>
+                            </m:oMathPara>
+                          </a14:m>
+                          <a:endParaRPr lang="es-CL" sz="2000" b="0" dirty="0"/>
+                        </a:p>
+                      </a:txBody>
+                      <a:tcPr/>
+                    </a:tc>
+                    <a:tc>
+                      <a:txBody>
+                        <a:bodyPr/>
+                        <a:lstStyle/>
+                        <a:p>
+                          <a:pPr marL="0" marR="0" lvl="0" indent="0" algn="l" defTabSz="914400" rtl="0" eaLnBrk="1" fontAlgn="auto" latinLnBrk="0" hangingPunct="1">
+                            <a:lnSpc>
+                              <a:spcPct val="100000"/>
+                            </a:lnSpc>
+                            <a:spcBef>
+                              <a:spcPts val="0"/>
+                            </a:spcBef>
+                            <a:spcAft>
+                              <a:spcPts val="0"/>
+                            </a:spcAft>
+                            <a:buClrTx/>
+                            <a:buSzTx/>
+                            <a:buFontTx/>
+                            <a:buNone/>
+                            <a:tabLst/>
+                            <a:defRPr/>
+                          </a:pPr>
+                          <a14:m>
+                            <m:oMathPara xmlns:m="http://schemas.openxmlformats.org/officeDocument/2006/math">
+                              <m:oMathParaPr>
+                                <m:jc m:val="centerGroup"/>
+                              </m:oMathParaPr>
+                              <m:oMath xmlns:m="http://schemas.openxmlformats.org/officeDocument/2006/math">
+                                <m:r>
+                                  <a:rPr lang="es-CL" sz="2000" b="0" i="1" smtClean="0">
+                                    <a:latin typeface="Cambria Math" panose="02040503050406030204" pitchFamily="18" charset="0"/>
+                                  </a:rPr>
+                                  <m:t>𝑂</m:t>
+                                </m:r>
+                                <m:r>
+                                  <a:rPr lang="es-CL" sz="2000" b="0" i="1" smtClean="0">
+                                    <a:latin typeface="Cambria Math" panose="02040503050406030204" pitchFamily="18" charset="0"/>
+                                  </a:rPr>
+                                  <m:t>(</m:t>
+                                </m:r>
+                                <m:r>
+                                  <a:rPr lang="es-CL" sz="2000" b="0" i="1" smtClean="0">
+                                    <a:latin typeface="Cambria Math" panose="02040503050406030204" pitchFamily="18" charset="0"/>
+                                  </a:rPr>
+                                  <m:t>𝑛</m:t>
+                                </m:r>
+                                <m:r>
+                                  <a:rPr lang="es-CL" sz="2000" b="0" i="1" smtClean="0">
+                                    <a:latin typeface="Cambria Math" panose="02040503050406030204" pitchFamily="18" charset="0"/>
+                                  </a:rPr>
+                                  <m:t>⋅</m:t>
+                                </m:r>
+                                <m:func>
+                                  <m:funcPr>
+                                    <m:ctrlPr>
+                                      <a:rPr lang="es-CL" sz="2000" b="0" i="1" smtClean="0">
+                                        <a:latin typeface="Cambria Math" panose="02040503050406030204" pitchFamily="18" charset="0"/>
+                                      </a:rPr>
+                                    </m:ctrlPr>
+                                  </m:funcPr>
+                                  <m:fName>
+                                    <m:r>
+                                      <m:rPr>
+                                        <m:sty m:val="p"/>
+                                      </m:rPr>
+                                      <a:rPr lang="es-CL" sz="2000" b="0" i="0" smtClean="0">
+                                        <a:latin typeface="Cambria Math" panose="02040503050406030204" pitchFamily="18" charset="0"/>
+                                      </a:rPr>
+                                      <m:t>log</m:t>
+                                    </m:r>
+                                  </m:fName>
+                                  <m:e>
+                                    <m:r>
+                                      <a:rPr lang="es-CL" sz="2000" b="0" i="1" smtClean="0">
+                                        <a:latin typeface="Cambria Math" panose="02040503050406030204" pitchFamily="18" charset="0"/>
+                                      </a:rPr>
+                                      <m:t>𝑛</m:t>
+                                    </m:r>
+                                    <m:r>
+                                      <a:rPr lang="es-CL" sz="2000" b="0" i="1" smtClean="0">
+                                        <a:latin typeface="Cambria Math" panose="02040503050406030204" pitchFamily="18" charset="0"/>
+                                      </a:rPr>
+                                      <m:t>)</m:t>
+                                    </m:r>
+                                  </m:e>
+                                </m:func>
+                              </m:oMath>
+                            </m:oMathPara>
+                          </a14:m>
+                          <a:endParaRPr lang="es-CL" sz="2000" b="0" dirty="0"/>
+                        </a:p>
+                      </a:txBody>
+                      <a:tcPr/>
+                    </a:tc>
+                    <a:tc>
+                      <a:txBody>
+                        <a:bodyPr/>
+                        <a:lstStyle/>
+                        <a:p>
+                          <a:pPr marL="0" marR="0" lvl="0" indent="0" algn="l" defTabSz="914400" rtl="0" eaLnBrk="1" fontAlgn="auto" latinLnBrk="0" hangingPunct="1">
+                            <a:lnSpc>
+                              <a:spcPct val="100000"/>
+                            </a:lnSpc>
+                            <a:spcBef>
+                              <a:spcPts val="0"/>
+                            </a:spcBef>
+                            <a:spcAft>
+                              <a:spcPts val="0"/>
+                            </a:spcAft>
+                            <a:buClrTx/>
+                            <a:buSzTx/>
+                            <a:buFontTx/>
+                            <a:buNone/>
+                            <a:tabLst/>
+                            <a:defRPr/>
+                          </a:pPr>
+                          <a14:m>
+                            <m:oMathPara xmlns:m="http://schemas.openxmlformats.org/officeDocument/2006/math">
+                              <m:oMathParaPr>
+                                <m:jc m:val="centerGroup"/>
+                              </m:oMathParaPr>
+                              <m:oMath xmlns:m="http://schemas.openxmlformats.org/officeDocument/2006/math">
+                                <m:r>
+                                  <a:rPr lang="es-CL" sz="2000" b="0" i="1" smtClean="0">
+                                    <a:latin typeface="Cambria Math" panose="02040503050406030204" pitchFamily="18" charset="0"/>
+                                  </a:rPr>
+                                  <m:t>𝑂</m:t>
+                                </m:r>
+                                <m:d>
+                                  <m:dPr>
+                                    <m:ctrlPr>
+                                      <a:rPr lang="es-CL" sz="2000" b="0" i="1" smtClean="0">
+                                        <a:latin typeface="Cambria Math" panose="02040503050406030204" pitchFamily="18" charset="0"/>
+                                      </a:rPr>
+                                    </m:ctrlPr>
+                                  </m:dPr>
+                                  <m:e>
+                                    <m:r>
+                                      <a:rPr lang="es-CL" sz="2000" b="0" i="1" smtClean="0">
+                                        <a:latin typeface="Cambria Math" panose="02040503050406030204" pitchFamily="18" charset="0"/>
+                                      </a:rPr>
+                                      <m:t>1</m:t>
+                                    </m:r>
+                                  </m:e>
+                                </m:d>
+                              </m:oMath>
+                            </m:oMathPara>
+                          </a14:m>
+                          <a:endParaRPr lang="es-CL" sz="2000" b="0" dirty="0"/>
+                        </a:p>
+                      </a:txBody>
+                      <a:tcPr/>
+                    </a:tc>
+                    <a:extLst>
+                      <a:ext uri="{0D108BD9-81ED-4DB2-BD59-A6C34878D82A}">
+                        <a16:rowId xmlns:a16="http://schemas.microsoft.com/office/drawing/2014/main" val="3520643873"/>
+                      </a:ext>
+                    </a:extLst>
+                  </a:tr>
+                </a:tbl>
+              </a:graphicData>
+            </a:graphic>
+          </p:graphicFrame>
+        </mc:Choice>
+        <mc:Fallback>
+          <p:graphicFrame>
+            <p:nvGraphicFramePr>
+              <p:cNvPr id="4" name="Marcador de contenido 3">
+                <a:extLst>
+                  <a:ext uri="{FF2B5EF4-FFF2-40B4-BE49-F238E27FC236}">
+                    <a16:creationId xmlns:a16="http://schemas.microsoft.com/office/drawing/2014/main" id="{4A68CF4A-9AC6-4DAE-B1A5-C23B6573AD8C}"/>
+                  </a:ext>
+                </a:extLst>
+              </p:cNvPr>
+              <p:cNvGraphicFramePr>
+                <a:graphicFrameLocks noGrp="1"/>
+              </p:cNvGraphicFramePr>
+              <p:nvPr>
+                <p:ph idx="1"/>
+                <p:extLst>
+                  <p:ext uri="{D42A27DB-BD31-4B8C-83A1-F6EECF244321}">
+                    <p14:modId xmlns:p14="http://schemas.microsoft.com/office/powerpoint/2010/main" val="2443921693"/>
+                  </p:ext>
+                </p:extLst>
+              </p:nvPr>
+            </p:nvGraphicFramePr>
+            <p:xfrm>
+              <a:off x="250825" y="1287463"/>
+              <a:ext cx="8642350" cy="2682240"/>
+            </p:xfrm>
+            <a:graphic>
+              <a:graphicData uri="http://schemas.openxmlformats.org/drawingml/2006/table">
+                <a:tbl>
+                  <a:tblPr firstRow="1" bandRow="1">
+                    <a:tableStyleId>{BC89EF96-8CEA-46FF-86C4-4CE0E7609802}</a:tableStyleId>
+                  </a:tblPr>
+                  <a:tblGrid>
+                    <a:gridCol w="1728470">
+                      <a:extLst>
+                        <a:ext uri="{9D8B030D-6E8A-4147-A177-3AD203B41FA5}">
+                          <a16:colId xmlns:a16="http://schemas.microsoft.com/office/drawing/2014/main" val="913066021"/>
+                        </a:ext>
+                      </a:extLst>
+                    </a:gridCol>
+                    <a:gridCol w="1728470">
+                      <a:extLst>
+                        <a:ext uri="{9D8B030D-6E8A-4147-A177-3AD203B41FA5}">
+                          <a16:colId xmlns:a16="http://schemas.microsoft.com/office/drawing/2014/main" val="3692818971"/>
+                        </a:ext>
+                      </a:extLst>
+                    </a:gridCol>
+                    <a:gridCol w="1728470">
+                      <a:extLst>
+                        <a:ext uri="{9D8B030D-6E8A-4147-A177-3AD203B41FA5}">
+                          <a16:colId xmlns:a16="http://schemas.microsoft.com/office/drawing/2014/main" val="585403358"/>
+                        </a:ext>
+                      </a:extLst>
+                    </a:gridCol>
+                    <a:gridCol w="1728470">
+                      <a:extLst>
+                        <a:ext uri="{9D8B030D-6E8A-4147-A177-3AD203B41FA5}">
+                          <a16:colId xmlns:a16="http://schemas.microsoft.com/office/drawing/2014/main" val="1311638582"/>
+                        </a:ext>
+                      </a:extLst>
+                    </a:gridCol>
+                    <a:gridCol w="1728470">
+                      <a:extLst>
+                        <a:ext uri="{9D8B030D-6E8A-4147-A177-3AD203B41FA5}">
+                          <a16:colId xmlns:a16="http://schemas.microsoft.com/office/drawing/2014/main" val="952865867"/>
+                        </a:ext>
+                      </a:extLst>
+                    </a:gridCol>
+                  </a:tblGrid>
+                  <a:tr h="701040">
+                    <a:tc>
+                      <a:txBody>
+                        <a:bodyPr/>
+                        <a:lstStyle/>
+                        <a:p>
+                          <a:pPr algn="ctr"/>
+                          <a:r>
+                            <a:rPr lang="es-CL" sz="2000" dirty="0"/>
+                            <a:t>Algoritmo</a:t>
+                          </a:r>
+                        </a:p>
+                      </a:txBody>
+                      <a:tcPr anchor="ctr">
+                        <a:noFill/>
+                      </a:tcPr>
+                    </a:tc>
+                    <a:tc>
+                      <a:txBody>
+                        <a:bodyPr/>
+                        <a:lstStyle/>
+                        <a:p>
+                          <a:pPr algn="ctr"/>
+                          <a:r>
+                            <a:rPr lang="es-CL" sz="2000" dirty="0"/>
+                            <a:t>Mejor caso</a:t>
+                          </a:r>
+                        </a:p>
+                      </a:txBody>
+                      <a:tcPr anchor="ctr"/>
+                    </a:tc>
+                    <a:tc>
+                      <a:txBody>
+                        <a:bodyPr/>
+                        <a:lstStyle/>
+                        <a:p>
+                          <a:pPr algn="ctr"/>
+                          <a:r>
+                            <a:rPr lang="es-CL" sz="2000" dirty="0"/>
+                            <a:t>Caso promedio</a:t>
+                          </a:r>
+                        </a:p>
+                      </a:txBody>
+                      <a:tcPr anchor="ctr"/>
+                    </a:tc>
+                    <a:tc>
+                      <a:txBody>
+                        <a:bodyPr/>
+                        <a:lstStyle/>
+                        <a:p>
+                          <a:pPr algn="ctr"/>
+                          <a:r>
+                            <a:rPr lang="es-CL" sz="2000" dirty="0"/>
+                            <a:t>Peor caso</a:t>
+                          </a:r>
+                        </a:p>
+                      </a:txBody>
+                      <a:tcPr anchor="ctr"/>
+                    </a:tc>
+                    <a:tc>
+                      <a:txBody>
+                        <a:bodyPr/>
+                        <a:lstStyle/>
+                        <a:p>
+                          <a:pPr algn="ctr"/>
+                          <a:r>
+                            <a:rPr lang="es-CL" sz="2000" dirty="0"/>
+                            <a:t>Memoria adicional</a:t>
+                          </a:r>
+                        </a:p>
+                      </a:txBody>
+                      <a:tcPr anchor="ctr"/>
+                    </a:tc>
+                    <a:extLst>
+                      <a:ext uri="{0D108BD9-81ED-4DB2-BD59-A6C34878D82A}">
+                        <a16:rowId xmlns:a16="http://schemas.microsoft.com/office/drawing/2014/main" val="1454344222"/>
+                      </a:ext>
+                    </a:extLst>
+                  </a:tr>
+                  <a:tr h="396240">
+                    <a:tc>
+                      <a:txBody>
+                        <a:bodyPr/>
+                        <a:lstStyle/>
+                        <a:p>
+                          <a:pPr algn="ctr"/>
+                          <a:r>
+                            <a:rPr lang="es-CL" sz="2000" dirty="0" err="1"/>
+                            <a:t>SelectionSort</a:t>
+                          </a:r>
+                          <a:endParaRPr lang="es-CL" sz="2000" dirty="0"/>
+                        </a:p>
+                      </a:txBody>
+                      <a:tcPr/>
+                    </a:tc>
+                    <a:tc>
+                      <a:txBody>
+                        <a:bodyPr/>
+                        <a:lstStyle/>
+                        <a:p>
+                          <a:endParaRPr lang="en-US"/>
+                        </a:p>
+                      </a:txBody>
+                      <a:tcPr>
+                        <a:blipFill>
+                          <a:blip r:embed="rId2"/>
+                          <a:stretch>
+                            <a:fillRect l="-100707" t="-184615" r="-301767" b="-427692"/>
+                          </a:stretch>
+                        </a:blipFill>
+                      </a:tcPr>
+                    </a:tc>
+                    <a:tc>
+                      <a:txBody>
+                        <a:bodyPr/>
+                        <a:lstStyle/>
+                        <a:p>
+                          <a:endParaRPr lang="en-US"/>
+                        </a:p>
+                      </a:txBody>
+                      <a:tcPr>
+                        <a:blipFill>
+                          <a:blip r:embed="rId2"/>
+                          <a:stretch>
+                            <a:fillRect l="-200000" t="-184615" r="-200704" b="-427692"/>
+                          </a:stretch>
+                        </a:blipFill>
+                      </a:tcPr>
+                    </a:tc>
+                    <a:tc>
+                      <a:txBody>
+                        <a:bodyPr/>
+                        <a:lstStyle/>
+                        <a:p>
+                          <a:endParaRPr lang="en-US"/>
+                        </a:p>
+                      </a:txBody>
+                      <a:tcPr>
+                        <a:blipFill>
+                          <a:blip r:embed="rId2"/>
+                          <a:stretch>
+                            <a:fillRect l="-301060" t="-184615" r="-101413" b="-427692"/>
+                          </a:stretch>
+                        </a:blipFill>
+                      </a:tcPr>
+                    </a:tc>
+                    <a:tc>
+                      <a:txBody>
+                        <a:bodyPr/>
+                        <a:lstStyle/>
+                        <a:p>
+                          <a:endParaRPr lang="en-US"/>
+                        </a:p>
+                      </a:txBody>
+                      <a:tcPr>
+                        <a:blipFill>
+                          <a:blip r:embed="rId2"/>
+                          <a:stretch>
+                            <a:fillRect l="-399648" t="-184615" r="-1056" b="-427692"/>
+                          </a:stretch>
+                        </a:blipFill>
+                      </a:tcPr>
+                    </a:tc>
+                    <a:extLst>
+                      <a:ext uri="{0D108BD9-81ED-4DB2-BD59-A6C34878D82A}">
+                        <a16:rowId xmlns:a16="http://schemas.microsoft.com/office/drawing/2014/main" val="1773186148"/>
+                      </a:ext>
+                    </a:extLst>
+                  </a:tr>
+                  <a:tr h="396240">
+                    <a:tc>
+                      <a:txBody>
+                        <a:bodyPr/>
+                        <a:lstStyle/>
+                        <a:p>
+                          <a:pPr algn="ctr"/>
+                          <a:r>
+                            <a:rPr lang="es-CL" sz="2000" dirty="0" err="1"/>
+                            <a:t>InsertionSort</a:t>
+                          </a:r>
+                          <a:endParaRPr lang="es-CL" sz="2000" dirty="0"/>
+                        </a:p>
+                      </a:txBody>
+                      <a:tcPr/>
+                    </a:tc>
+                    <a:tc>
+                      <a:txBody>
+                        <a:bodyPr/>
+                        <a:lstStyle/>
+                        <a:p>
+                          <a:endParaRPr lang="en-US"/>
+                        </a:p>
+                      </a:txBody>
+                      <a:tcPr>
+                        <a:blipFill>
+                          <a:blip r:embed="rId2"/>
+                          <a:stretch>
+                            <a:fillRect l="-100707" t="-280303" r="-301767" b="-321212"/>
+                          </a:stretch>
+                        </a:blipFill>
+                      </a:tcPr>
+                    </a:tc>
+                    <a:tc>
+                      <a:txBody>
+                        <a:bodyPr/>
+                        <a:lstStyle/>
+                        <a:p>
+                          <a:endParaRPr lang="en-US"/>
+                        </a:p>
+                      </a:txBody>
+                      <a:tcPr>
+                        <a:blipFill>
+                          <a:blip r:embed="rId2"/>
+                          <a:stretch>
+                            <a:fillRect l="-200000" t="-280303" r="-200704" b="-321212"/>
+                          </a:stretch>
+                        </a:blipFill>
+                      </a:tcPr>
+                    </a:tc>
+                    <a:tc>
+                      <a:txBody>
+                        <a:bodyPr/>
+                        <a:lstStyle/>
+                        <a:p>
+                          <a:endParaRPr lang="en-US"/>
+                        </a:p>
+                      </a:txBody>
+                      <a:tcPr>
+                        <a:blipFill>
+                          <a:blip r:embed="rId2"/>
+                          <a:stretch>
+                            <a:fillRect l="-301060" t="-280303" r="-101413" b="-321212"/>
+                          </a:stretch>
+                        </a:blipFill>
+                      </a:tcPr>
+                    </a:tc>
+                    <a:tc>
+                      <a:txBody>
+                        <a:bodyPr/>
+                        <a:lstStyle/>
+                        <a:p>
+                          <a:endParaRPr lang="en-US"/>
+                        </a:p>
+                      </a:txBody>
+                      <a:tcPr>
+                        <a:blipFill>
+                          <a:blip r:embed="rId2"/>
+                          <a:stretch>
+                            <a:fillRect l="-399648" t="-280303" r="-1056" b="-321212"/>
+                          </a:stretch>
+                        </a:blipFill>
+                      </a:tcPr>
+                    </a:tc>
+                    <a:extLst>
+                      <a:ext uri="{0D108BD9-81ED-4DB2-BD59-A6C34878D82A}">
+                        <a16:rowId xmlns:a16="http://schemas.microsoft.com/office/drawing/2014/main" val="2097436092"/>
+                      </a:ext>
+                    </a:extLst>
+                  </a:tr>
+                  <a:tr h="396240">
+                    <a:tc>
+                      <a:txBody>
+                        <a:bodyPr/>
+                        <a:lstStyle/>
+                        <a:p>
+                          <a:pPr algn="ctr"/>
+                          <a:r>
+                            <a:rPr lang="es-CL" sz="2000" dirty="0" err="1"/>
+                            <a:t>QuickSort</a:t>
+                          </a:r>
+                          <a:endParaRPr lang="es-CL" sz="2000" dirty="0"/>
+                        </a:p>
+                      </a:txBody>
+                      <a:tcPr/>
+                    </a:tc>
+                    <a:tc>
+                      <a:txBody>
+                        <a:bodyPr/>
+                        <a:lstStyle/>
+                        <a:p>
+                          <a:endParaRPr lang="en-US"/>
+                        </a:p>
+                      </a:txBody>
+                      <a:tcPr>
+                        <a:blipFill>
+                          <a:blip r:embed="rId2"/>
+                          <a:stretch>
+                            <a:fillRect l="-100707" t="-386154" r="-301767" b="-226154"/>
+                          </a:stretch>
+                        </a:blipFill>
+                      </a:tcPr>
+                    </a:tc>
+                    <a:tc>
+                      <a:txBody>
+                        <a:bodyPr/>
+                        <a:lstStyle/>
+                        <a:p>
+                          <a:endParaRPr lang="en-US"/>
+                        </a:p>
+                      </a:txBody>
+                      <a:tcPr>
+                        <a:blipFill>
+                          <a:blip r:embed="rId2"/>
+                          <a:stretch>
+                            <a:fillRect l="-200000" t="-386154" r="-200704" b="-226154"/>
+                          </a:stretch>
+                        </a:blipFill>
+                      </a:tcPr>
+                    </a:tc>
+                    <a:tc>
+                      <a:txBody>
+                        <a:bodyPr/>
+                        <a:lstStyle/>
+                        <a:p>
+                          <a:endParaRPr lang="en-US"/>
+                        </a:p>
+                      </a:txBody>
+                      <a:tcPr>
+                        <a:blipFill>
+                          <a:blip r:embed="rId2"/>
+                          <a:stretch>
+                            <a:fillRect l="-301060" t="-386154" r="-101413" b="-226154"/>
+                          </a:stretch>
+                        </a:blipFill>
+                      </a:tcPr>
+                    </a:tc>
+                    <a:tc>
+                      <a:txBody>
+                        <a:bodyPr/>
+                        <a:lstStyle/>
+                        <a:p>
+                          <a:endParaRPr lang="en-US"/>
+                        </a:p>
+                      </a:txBody>
+                      <a:tcPr>
+                        <a:blipFill>
+                          <a:blip r:embed="rId2"/>
+                          <a:stretch>
+                            <a:fillRect l="-399648" t="-386154" r="-1056" b="-226154"/>
+                          </a:stretch>
+                        </a:blipFill>
+                      </a:tcPr>
+                    </a:tc>
+                    <a:extLst>
+                      <a:ext uri="{0D108BD9-81ED-4DB2-BD59-A6C34878D82A}">
+                        <a16:rowId xmlns:a16="http://schemas.microsoft.com/office/drawing/2014/main" val="3390602628"/>
+                      </a:ext>
+                    </a:extLst>
+                  </a:tr>
+                  <a:tr h="396240">
+                    <a:tc>
+                      <a:txBody>
+                        <a:bodyPr/>
+                        <a:lstStyle/>
+                        <a:p>
+                          <a:pPr algn="ctr"/>
+                          <a:r>
+                            <a:rPr lang="es-CL" sz="2000" i="0" dirty="0" err="1"/>
+                            <a:t>MergeSort</a:t>
+                          </a:r>
+                          <a:endParaRPr lang="es-CL" sz="2000" i="0" dirty="0"/>
+                        </a:p>
+                      </a:txBody>
+                      <a:tcPr/>
+                    </a:tc>
+                    <a:tc>
+                      <a:txBody>
+                        <a:bodyPr/>
+                        <a:lstStyle/>
+                        <a:p>
+                          <a:endParaRPr lang="en-US"/>
+                        </a:p>
+                      </a:txBody>
+                      <a:tcPr>
+                        <a:blipFill>
+                          <a:blip r:embed="rId2"/>
+                          <a:stretch>
+                            <a:fillRect l="-100707" t="-486154" r="-301767" b="-126154"/>
+                          </a:stretch>
+                        </a:blipFill>
+                      </a:tcPr>
+                    </a:tc>
+                    <a:tc>
+                      <a:txBody>
+                        <a:bodyPr/>
+                        <a:lstStyle/>
+                        <a:p>
+                          <a:endParaRPr lang="en-US"/>
+                        </a:p>
+                      </a:txBody>
+                      <a:tcPr>
+                        <a:blipFill>
+                          <a:blip r:embed="rId2"/>
+                          <a:stretch>
+                            <a:fillRect l="-200000" t="-486154" r="-200704" b="-126154"/>
+                          </a:stretch>
+                        </a:blipFill>
+                      </a:tcPr>
+                    </a:tc>
+                    <a:tc>
+                      <a:txBody>
+                        <a:bodyPr/>
+                        <a:lstStyle/>
+                        <a:p>
+                          <a:endParaRPr lang="en-US"/>
+                        </a:p>
+                      </a:txBody>
+                      <a:tcPr>
+                        <a:blipFill>
+                          <a:blip r:embed="rId2"/>
+                          <a:stretch>
+                            <a:fillRect l="-301060" t="-486154" r="-101413" b="-126154"/>
+                          </a:stretch>
+                        </a:blipFill>
+                      </a:tcPr>
+                    </a:tc>
+                    <a:tc>
+                      <a:txBody>
+                        <a:bodyPr/>
+                        <a:lstStyle/>
+                        <a:p>
+                          <a:endParaRPr lang="en-US"/>
+                        </a:p>
+                      </a:txBody>
+                      <a:tcPr>
+                        <a:blipFill>
+                          <a:blip r:embed="rId2"/>
+                          <a:stretch>
+                            <a:fillRect l="-399648" t="-486154" r="-1056" b="-126154"/>
+                          </a:stretch>
+                        </a:blipFill>
+                      </a:tcPr>
+                    </a:tc>
+                    <a:extLst>
+                      <a:ext uri="{0D108BD9-81ED-4DB2-BD59-A6C34878D82A}">
+                        <a16:rowId xmlns:a16="http://schemas.microsoft.com/office/drawing/2014/main" val="3721942469"/>
+                      </a:ext>
+                    </a:extLst>
+                  </a:tr>
+                  <a:tr h="396240">
+                    <a:tc>
+                      <a:txBody>
+                        <a:bodyPr/>
+                        <a:lstStyle/>
+                        <a:p>
+                          <a:pPr algn="ctr"/>
+                          <a:r>
+                            <a:rPr lang="es-CL" sz="2000" dirty="0"/>
+                            <a:t>?????</a:t>
+                          </a:r>
+                        </a:p>
+                      </a:txBody>
+                      <a:tcPr/>
+                    </a:tc>
+                    <a:tc>
+                      <a:txBody>
+                        <a:bodyPr/>
+                        <a:lstStyle/>
+                        <a:p>
+                          <a:endParaRPr lang="en-US"/>
+                        </a:p>
+                      </a:txBody>
+                      <a:tcPr>
+                        <a:blipFill>
+                          <a:blip r:embed="rId2"/>
+                          <a:stretch>
+                            <a:fillRect l="-100707" t="-586154" r="-301767" b="-26154"/>
+                          </a:stretch>
+                        </a:blipFill>
+                      </a:tcPr>
+                    </a:tc>
+                    <a:tc>
+                      <a:txBody>
+                        <a:bodyPr/>
+                        <a:lstStyle/>
+                        <a:p>
+                          <a:endParaRPr lang="en-US"/>
+                        </a:p>
+                      </a:txBody>
+                      <a:tcPr>
+                        <a:blipFill>
+                          <a:blip r:embed="rId2"/>
+                          <a:stretch>
+                            <a:fillRect l="-200000" t="-586154" r="-200704" b="-26154"/>
+                          </a:stretch>
+                        </a:blipFill>
+                      </a:tcPr>
+                    </a:tc>
+                    <a:tc>
+                      <a:txBody>
+                        <a:bodyPr/>
+                        <a:lstStyle/>
+                        <a:p>
+                          <a:endParaRPr lang="en-US"/>
+                        </a:p>
+                      </a:txBody>
+                      <a:tcPr>
+                        <a:blipFill>
+                          <a:blip r:embed="rId2"/>
+                          <a:stretch>
+                            <a:fillRect l="-301060" t="-586154" r="-101413" b="-26154"/>
+                          </a:stretch>
+                        </a:blipFill>
+                      </a:tcPr>
+                    </a:tc>
+                    <a:tc>
+                      <a:txBody>
+                        <a:bodyPr/>
+                        <a:lstStyle/>
+                        <a:p>
+                          <a:endParaRPr lang="en-US"/>
+                        </a:p>
+                      </a:txBody>
+                      <a:tcPr>
+                        <a:blipFill>
+                          <a:blip r:embed="rId2"/>
+                          <a:stretch>
+                            <a:fillRect l="-399648" t="-586154" r="-1056" b="-26154"/>
+                          </a:stretch>
+                        </a:blipFill>
+                      </a:tcPr>
+                    </a:tc>
+                    <a:extLst>
+                      <a:ext uri="{0D108BD9-81ED-4DB2-BD59-A6C34878D82A}">
+                        <a16:rowId xmlns:a16="http://schemas.microsoft.com/office/drawing/2014/main" val="3520643873"/>
+                      </a:ext>
+                    </a:extLst>
+                  </a:tr>
+                </a:tbl>
+              </a:graphicData>
+            </a:graphic>
+          </p:graphicFrame>
+        </mc:Fallback>
+      </mc:AlternateContent>
+      <p:sp>
+        <p:nvSpPr>
+          <p:cNvPr id="7" name="CuadroTexto 6">
+            <a:extLst>
+              <a:ext uri="{FF2B5EF4-FFF2-40B4-BE49-F238E27FC236}">
+                <a16:creationId xmlns:a16="http://schemas.microsoft.com/office/drawing/2014/main" id="{B09FC234-0C85-4AC3-89A3-C3A71CBE897B}"/>
+              </a:ext>
+            </a:extLst>
+          </p:cNvPr>
+          <p:cNvSpPr txBox="1"/>
+          <p:nvPr/>
+        </p:nvSpPr>
+        <p:spPr>
+          <a:xfrm>
+            <a:off x="250184" y="4257675"/>
+            <a:ext cx="8642350" cy="1815882"/>
+          </a:xfrm>
+          <a:prstGeom prst="rect">
+            <a:avLst/>
+          </a:prstGeom>
+          <a:noFill/>
+        </p:spPr>
+        <p:txBody>
+          <a:bodyPr wrap="square" rtlCol="0">
+            <a:spAutoFit/>
+          </a:bodyPr>
+          <a:lstStyle/>
+          <a:p>
+            <a:r>
+              <a:rPr lang="es-CL" sz="2800" dirty="0">
+                <a:solidFill>
+                  <a:schemeClr val="tx1">
+                    <a:lumMod val="75000"/>
+                    <a:lumOff val="25000"/>
+                  </a:schemeClr>
+                </a:solidFill>
+              </a:rPr>
+              <a:t>Las demostraciones formales de complejidad de </a:t>
+            </a:r>
+            <a:r>
+              <a:rPr lang="es-CL" sz="2800" dirty="0" err="1">
+                <a:solidFill>
+                  <a:schemeClr val="tx1">
+                    <a:lumMod val="75000"/>
+                    <a:lumOff val="25000"/>
+                  </a:schemeClr>
+                </a:solidFill>
+              </a:rPr>
+              <a:t>QuickSort</a:t>
+            </a:r>
+            <a:r>
+              <a:rPr lang="es-CL" sz="2800" dirty="0">
+                <a:solidFill>
+                  <a:schemeClr val="tx1">
+                    <a:lumMod val="75000"/>
+                    <a:lumOff val="25000"/>
+                  </a:schemeClr>
+                </a:solidFill>
+              </a:rPr>
+              <a:t> se verán en ayudantía.</a:t>
+            </a:r>
+          </a:p>
+          <a:p>
+            <a:endParaRPr lang="es-CL" sz="2800" dirty="0">
+              <a:solidFill>
+                <a:schemeClr val="tx1">
+                  <a:lumMod val="75000"/>
+                  <a:lumOff val="25000"/>
+                </a:schemeClr>
+              </a:solidFill>
+            </a:endParaRPr>
+          </a:p>
+          <a:p>
+            <a:r>
+              <a:rPr lang="es-CL" sz="2800" dirty="0">
+                <a:solidFill>
+                  <a:schemeClr val="tx1">
+                    <a:lumMod val="75000"/>
+                    <a:lumOff val="25000"/>
+                  </a:schemeClr>
+                </a:solidFill>
+              </a:rPr>
+              <a:t>Y un último algoritmo que veremos este miércoles</a:t>
+            </a:r>
+          </a:p>
+        </p:txBody>
+      </p:sp>
+    </p:spTree>
+    <p:extLst>
+      <p:ext uri="{BB962C8B-B14F-4D97-AF65-F5344CB8AC3E}">
+        <p14:creationId xmlns:p14="http://schemas.microsoft.com/office/powerpoint/2010/main" val="4277611069"/>
       </p:ext>
     </p:extLst>
   </p:cSld>

</xml_diff>